<commit_message>
update fork and sync images and text
</commit_message>
<xml_diff>
--- a/source/_images/editables.pptx
+++ b/source/_images/editables.pptx
@@ -7,6 +7,7 @@
   <p:sldIdLst>
     <p:sldId id="256" r:id="rId2"/>
     <p:sldId id="257" r:id="rId3"/>
+    <p:sldId id="258" r:id="rId4"/>
   </p:sldIdLst>
   <p:sldSz cx="12192000" cy="6858000"/>
   <p:notesSz cx="6858000" cy="9144000"/>
@@ -4233,6 +4234,547 @@
 </p:sld>
 </file>
 
+<file path=ppt/slides/slide3.xml><?xml version="1.0" encoding="utf-8"?>
+<p:sld xmlns:a="http://schemas.openxmlformats.org/drawingml/2006/main" xmlns:r="http://schemas.openxmlformats.org/officeDocument/2006/relationships" xmlns:p="http://schemas.openxmlformats.org/presentationml/2006/main">
+  <p:cSld>
+    <p:spTree>
+      <p:nvGrpSpPr>
+        <p:cNvPr id="1" name=""/>
+        <p:cNvGrpSpPr/>
+        <p:nvPr/>
+      </p:nvGrpSpPr>
+      <p:grpSpPr>
+        <a:xfrm>
+          <a:off x="0" y="0"/>
+          <a:ext cx="0" cy="0"/>
+          <a:chOff x="0" y="0"/>
+          <a:chExt cx="0" cy="0"/>
+        </a:xfrm>
+      </p:grpSpPr>
+      <p:grpSp>
+        <p:nvGrpSpPr>
+          <p:cNvPr id="15" name="Group 14">
+            <a:extLst>
+              <a:ext uri="{FF2B5EF4-FFF2-40B4-BE49-F238E27FC236}">
+                <a16:creationId xmlns:a16="http://schemas.microsoft.com/office/drawing/2014/main" id="{8828397D-FBE7-4830-BAAB-96E74A73E6A8}"/>
+              </a:ext>
+            </a:extLst>
+          </p:cNvPr>
+          <p:cNvGrpSpPr/>
+          <p:nvPr/>
+        </p:nvGrpSpPr>
+        <p:grpSpPr>
+          <a:xfrm>
+            <a:off x="1606319" y="494060"/>
+            <a:ext cx="8979361" cy="5748134"/>
+            <a:chOff x="1606319" y="494060"/>
+            <a:chExt cx="8979361" cy="5748134"/>
+          </a:xfrm>
+        </p:grpSpPr>
+        <p:pic>
+          <p:nvPicPr>
+            <p:cNvPr id="5" name="Picture 4" descr="Graphical user interface, text, application&#10;&#10;Description automatically generated">
+              <a:extLst>
+                <a:ext uri="{FF2B5EF4-FFF2-40B4-BE49-F238E27FC236}">
+                  <a16:creationId xmlns:a16="http://schemas.microsoft.com/office/drawing/2014/main" id="{4E088DE8-D840-47F9-A36C-A54ECE339482}"/>
+                </a:ext>
+              </a:extLst>
+            </p:cNvPr>
+            <p:cNvPicPr>
+              <a:picLocks noChangeAspect="1"/>
+            </p:cNvPicPr>
+            <p:nvPr/>
+          </p:nvPicPr>
+          <p:blipFill>
+            <a:blip r:embed="rId2">
+              <a:extLst>
+                <a:ext uri="{28A0092B-C50C-407E-A947-70E740481C1C}">
+                  <a14:useLocalDpi xmlns:a14="http://schemas.microsoft.com/office/drawing/2010/main" val="0"/>
+                </a:ext>
+              </a:extLst>
+            </a:blip>
+            <a:stretch>
+              <a:fillRect/>
+            </a:stretch>
+          </p:blipFill>
+          <p:spPr>
+            <a:xfrm>
+              <a:off x="1606319" y="615805"/>
+              <a:ext cx="8979361" cy="5626389"/>
+            </a:xfrm>
+            <a:prstGeom prst="rect">
+              <a:avLst/>
+            </a:prstGeom>
+            <a:ln>
+              <a:noFill/>
+            </a:ln>
+            <a:effectLst>
+              <a:outerShdw blurRad="292100" dist="139700" dir="2700000" algn="tl" rotWithShape="0">
+                <a:srgbClr val="333333">
+                  <a:alpha val="65000"/>
+                </a:srgbClr>
+              </a:outerShdw>
+            </a:effectLst>
+          </p:spPr>
+        </p:pic>
+        <p:sp>
+          <p:nvSpPr>
+            <p:cNvPr id="6" name="Arrow: Down 5">
+              <a:extLst>
+                <a:ext uri="{FF2B5EF4-FFF2-40B4-BE49-F238E27FC236}">
+                  <a16:creationId xmlns:a16="http://schemas.microsoft.com/office/drawing/2014/main" id="{2A95D366-2462-4593-BCFF-96F9B2A8A0AE}"/>
+                </a:ext>
+              </a:extLst>
+            </p:cNvPr>
+            <p:cNvSpPr/>
+            <p:nvPr/>
+          </p:nvSpPr>
+          <p:spPr>
+            <a:xfrm rot="16857918">
+              <a:off x="6320159" y="483945"/>
+              <a:ext cx="309325" cy="1236518"/>
+            </a:xfrm>
+            <a:prstGeom prst="downArrow">
+              <a:avLst/>
+            </a:prstGeom>
+            <a:solidFill>
+              <a:srgbClr val="FF0000"/>
+            </a:solidFill>
+            <a:ln>
+              <a:solidFill>
+                <a:srgbClr val="FF0000"/>
+              </a:solidFill>
+            </a:ln>
+          </p:spPr>
+          <p:style>
+            <a:lnRef idx="2">
+              <a:schemeClr val="accent1">
+                <a:shade val="50000"/>
+              </a:schemeClr>
+            </a:lnRef>
+            <a:fillRef idx="1">
+              <a:schemeClr val="accent1"/>
+            </a:fillRef>
+            <a:effectRef idx="0">
+              <a:schemeClr val="accent1"/>
+            </a:effectRef>
+            <a:fontRef idx="minor">
+              <a:schemeClr val="lt1"/>
+            </a:fontRef>
+          </p:style>
+          <p:txBody>
+            <a:bodyPr rtlCol="0" anchor="ctr"/>
+            <a:lstStyle/>
+            <a:p>
+              <a:pPr algn="ctr"/>
+              <a:endParaRPr lang="en-GB"/>
+            </a:p>
+          </p:txBody>
+        </p:sp>
+        <p:sp>
+          <p:nvSpPr>
+            <p:cNvPr id="7" name="Oval 6">
+              <a:extLst>
+                <a:ext uri="{FF2B5EF4-FFF2-40B4-BE49-F238E27FC236}">
+                  <a16:creationId xmlns:a16="http://schemas.microsoft.com/office/drawing/2014/main" id="{BC9496BA-9532-43AF-9716-FBAE479FFC4C}"/>
+                </a:ext>
+              </a:extLst>
+            </p:cNvPr>
+            <p:cNvSpPr/>
+            <p:nvPr/>
+          </p:nvSpPr>
+          <p:spPr>
+            <a:xfrm rot="60630">
+              <a:off x="5181323" y="496335"/>
+              <a:ext cx="757645" cy="703336"/>
+            </a:xfrm>
+            <a:prstGeom prst="ellipse">
+              <a:avLst/>
+            </a:prstGeom>
+            <a:solidFill>
+              <a:schemeClr val="bg1"/>
+            </a:solidFill>
+            <a:ln w="28575">
+              <a:solidFill>
+                <a:srgbClr val="FF0000"/>
+              </a:solidFill>
+            </a:ln>
+          </p:spPr>
+          <p:style>
+            <a:lnRef idx="2">
+              <a:schemeClr val="accent1">
+                <a:shade val="50000"/>
+              </a:schemeClr>
+            </a:lnRef>
+            <a:fillRef idx="1">
+              <a:schemeClr val="accent1"/>
+            </a:fillRef>
+            <a:effectRef idx="0">
+              <a:schemeClr val="accent1"/>
+            </a:effectRef>
+            <a:fontRef idx="minor">
+              <a:schemeClr val="lt1"/>
+            </a:fontRef>
+          </p:style>
+          <p:txBody>
+            <a:bodyPr rtlCol="0" anchor="ctr"/>
+            <a:lstStyle/>
+            <a:p>
+              <a:pPr algn="ctr"/>
+              <a:endParaRPr lang="en-GB"/>
+            </a:p>
+          </p:txBody>
+        </p:sp>
+        <p:sp>
+          <p:nvSpPr>
+            <p:cNvPr id="8" name="TextBox 7">
+              <a:extLst>
+                <a:ext uri="{FF2B5EF4-FFF2-40B4-BE49-F238E27FC236}">
+                  <a16:creationId xmlns:a16="http://schemas.microsoft.com/office/drawing/2014/main" id="{545678A1-5E61-4118-8B2C-CAC5ED268E97}"/>
+                </a:ext>
+              </a:extLst>
+            </p:cNvPr>
+            <p:cNvSpPr txBox="1"/>
+            <p:nvPr/>
+          </p:nvSpPr>
+          <p:spPr>
+            <a:xfrm rot="60630">
+              <a:off x="5360411" y="494060"/>
+              <a:ext cx="399468" cy="707886"/>
+            </a:xfrm>
+            <a:prstGeom prst="rect">
+              <a:avLst/>
+            </a:prstGeom>
+            <a:noFill/>
+          </p:spPr>
+          <p:txBody>
+            <a:bodyPr wrap="none" rtlCol="0">
+              <a:spAutoFit/>
+            </a:bodyPr>
+            <a:lstStyle/>
+            <a:p>
+              <a:r>
+                <a:rPr lang="en-US" sz="4000" dirty="0">
+                  <a:latin typeface="Arvo" panose="02000000000000000000" pitchFamily="2" charset="0"/>
+                </a:rPr>
+                <a:t>1</a:t>
+              </a:r>
+              <a:endParaRPr lang="en-GB" sz="4000" dirty="0">
+                <a:latin typeface="Arvo" panose="02000000000000000000" pitchFamily="2" charset="0"/>
+              </a:endParaRPr>
+            </a:p>
+          </p:txBody>
+        </p:sp>
+        <p:sp>
+          <p:nvSpPr>
+            <p:cNvPr id="9" name="Arrow: Down 8">
+              <a:extLst>
+                <a:ext uri="{FF2B5EF4-FFF2-40B4-BE49-F238E27FC236}">
+                  <a16:creationId xmlns:a16="http://schemas.microsoft.com/office/drawing/2014/main" id="{5E476DF0-45C4-4025-96AA-E3AB08E16233}"/>
+                </a:ext>
+              </a:extLst>
+            </p:cNvPr>
+            <p:cNvSpPr/>
+            <p:nvPr/>
+          </p:nvSpPr>
+          <p:spPr>
+            <a:xfrm rot="16857918">
+              <a:off x="3546478" y="2023184"/>
+              <a:ext cx="309325" cy="1236518"/>
+            </a:xfrm>
+            <a:prstGeom prst="downArrow">
+              <a:avLst/>
+            </a:prstGeom>
+            <a:solidFill>
+              <a:srgbClr val="FF0000"/>
+            </a:solidFill>
+            <a:ln>
+              <a:solidFill>
+                <a:srgbClr val="FF0000"/>
+              </a:solidFill>
+            </a:ln>
+          </p:spPr>
+          <p:style>
+            <a:lnRef idx="2">
+              <a:schemeClr val="accent1">
+                <a:shade val="50000"/>
+              </a:schemeClr>
+            </a:lnRef>
+            <a:fillRef idx="1">
+              <a:schemeClr val="accent1"/>
+            </a:fillRef>
+            <a:effectRef idx="0">
+              <a:schemeClr val="accent1"/>
+            </a:effectRef>
+            <a:fontRef idx="minor">
+              <a:schemeClr val="lt1"/>
+            </a:fontRef>
+          </p:style>
+          <p:txBody>
+            <a:bodyPr rtlCol="0" anchor="ctr"/>
+            <a:lstStyle/>
+            <a:p>
+              <a:pPr algn="ctr"/>
+              <a:endParaRPr lang="en-GB"/>
+            </a:p>
+          </p:txBody>
+        </p:sp>
+        <p:sp>
+          <p:nvSpPr>
+            <p:cNvPr id="10" name="Oval 9">
+              <a:extLst>
+                <a:ext uri="{FF2B5EF4-FFF2-40B4-BE49-F238E27FC236}">
+                  <a16:creationId xmlns:a16="http://schemas.microsoft.com/office/drawing/2014/main" id="{4FF44FEB-8F76-42C3-81F1-FBFCDAD63F82}"/>
+                </a:ext>
+              </a:extLst>
+            </p:cNvPr>
+            <p:cNvSpPr/>
+            <p:nvPr/>
+          </p:nvSpPr>
+          <p:spPr>
+            <a:xfrm rot="60630">
+              <a:off x="2407642" y="2035574"/>
+              <a:ext cx="757645" cy="703336"/>
+            </a:xfrm>
+            <a:prstGeom prst="ellipse">
+              <a:avLst/>
+            </a:prstGeom>
+            <a:solidFill>
+              <a:schemeClr val="bg1"/>
+            </a:solidFill>
+            <a:ln w="28575">
+              <a:solidFill>
+                <a:srgbClr val="FF0000"/>
+              </a:solidFill>
+            </a:ln>
+          </p:spPr>
+          <p:style>
+            <a:lnRef idx="2">
+              <a:schemeClr val="accent1">
+                <a:shade val="50000"/>
+              </a:schemeClr>
+            </a:lnRef>
+            <a:fillRef idx="1">
+              <a:schemeClr val="accent1"/>
+            </a:fillRef>
+            <a:effectRef idx="0">
+              <a:schemeClr val="accent1"/>
+            </a:effectRef>
+            <a:fontRef idx="minor">
+              <a:schemeClr val="lt1"/>
+            </a:fontRef>
+          </p:style>
+          <p:txBody>
+            <a:bodyPr rtlCol="0" anchor="ctr"/>
+            <a:lstStyle/>
+            <a:p>
+              <a:pPr algn="ctr"/>
+              <a:endParaRPr lang="en-GB"/>
+            </a:p>
+          </p:txBody>
+        </p:sp>
+        <p:sp>
+          <p:nvSpPr>
+            <p:cNvPr id="11" name="TextBox 10">
+              <a:extLst>
+                <a:ext uri="{FF2B5EF4-FFF2-40B4-BE49-F238E27FC236}">
+                  <a16:creationId xmlns:a16="http://schemas.microsoft.com/office/drawing/2014/main" id="{0259071F-0581-413E-A4A4-46375AF70208}"/>
+                </a:ext>
+              </a:extLst>
+            </p:cNvPr>
+            <p:cNvSpPr txBox="1"/>
+            <p:nvPr/>
+          </p:nvSpPr>
+          <p:spPr>
+            <a:xfrm rot="60630">
+              <a:off x="2556273" y="2033299"/>
+              <a:ext cx="460382" cy="707886"/>
+            </a:xfrm>
+            <a:prstGeom prst="rect">
+              <a:avLst/>
+            </a:prstGeom>
+            <a:noFill/>
+          </p:spPr>
+          <p:txBody>
+            <a:bodyPr wrap="none" rtlCol="0">
+              <a:spAutoFit/>
+            </a:bodyPr>
+            <a:lstStyle/>
+            <a:p>
+              <a:r>
+                <a:rPr lang="en-US" sz="4000" dirty="0">
+                  <a:latin typeface="Arvo" panose="02000000000000000000" pitchFamily="2" charset="0"/>
+                </a:rPr>
+                <a:t>2</a:t>
+              </a:r>
+              <a:endParaRPr lang="en-GB" sz="4000" dirty="0">
+                <a:latin typeface="Arvo" panose="02000000000000000000" pitchFamily="2" charset="0"/>
+              </a:endParaRPr>
+            </a:p>
+          </p:txBody>
+        </p:sp>
+        <p:sp>
+          <p:nvSpPr>
+            <p:cNvPr id="12" name="Arrow: Down 11">
+              <a:extLst>
+                <a:ext uri="{FF2B5EF4-FFF2-40B4-BE49-F238E27FC236}">
+                  <a16:creationId xmlns:a16="http://schemas.microsoft.com/office/drawing/2014/main" id="{93E24A31-B792-4DF4-9A27-23D1ED6BC0C8}"/>
+                </a:ext>
+              </a:extLst>
+            </p:cNvPr>
+            <p:cNvSpPr/>
+            <p:nvPr/>
+          </p:nvSpPr>
+          <p:spPr>
+            <a:xfrm rot="16857918">
+              <a:off x="4563147" y="4070300"/>
+              <a:ext cx="309325" cy="1236518"/>
+            </a:xfrm>
+            <a:prstGeom prst="downArrow">
+              <a:avLst/>
+            </a:prstGeom>
+            <a:solidFill>
+              <a:srgbClr val="FF0000"/>
+            </a:solidFill>
+            <a:ln>
+              <a:solidFill>
+                <a:srgbClr val="FF0000"/>
+              </a:solidFill>
+            </a:ln>
+          </p:spPr>
+          <p:style>
+            <a:lnRef idx="2">
+              <a:schemeClr val="accent1">
+                <a:shade val="50000"/>
+              </a:schemeClr>
+            </a:lnRef>
+            <a:fillRef idx="1">
+              <a:schemeClr val="accent1"/>
+            </a:fillRef>
+            <a:effectRef idx="0">
+              <a:schemeClr val="accent1"/>
+            </a:effectRef>
+            <a:fontRef idx="minor">
+              <a:schemeClr val="lt1"/>
+            </a:fontRef>
+          </p:style>
+          <p:txBody>
+            <a:bodyPr rtlCol="0" anchor="ctr"/>
+            <a:lstStyle/>
+            <a:p>
+              <a:pPr algn="ctr"/>
+              <a:endParaRPr lang="en-GB"/>
+            </a:p>
+          </p:txBody>
+        </p:sp>
+        <p:sp>
+          <p:nvSpPr>
+            <p:cNvPr id="13" name="Oval 12">
+              <a:extLst>
+                <a:ext uri="{FF2B5EF4-FFF2-40B4-BE49-F238E27FC236}">
+                  <a16:creationId xmlns:a16="http://schemas.microsoft.com/office/drawing/2014/main" id="{DC6B221B-4C4F-4483-B6B2-4BE4FA7C95C1}"/>
+                </a:ext>
+              </a:extLst>
+            </p:cNvPr>
+            <p:cNvSpPr/>
+            <p:nvPr/>
+          </p:nvSpPr>
+          <p:spPr>
+            <a:xfrm rot="60630">
+              <a:off x="3424311" y="4082690"/>
+              <a:ext cx="757645" cy="703336"/>
+            </a:xfrm>
+            <a:prstGeom prst="ellipse">
+              <a:avLst/>
+            </a:prstGeom>
+            <a:solidFill>
+              <a:schemeClr val="bg1"/>
+            </a:solidFill>
+            <a:ln w="28575">
+              <a:solidFill>
+                <a:srgbClr val="FF0000"/>
+              </a:solidFill>
+            </a:ln>
+          </p:spPr>
+          <p:style>
+            <a:lnRef idx="2">
+              <a:schemeClr val="accent1">
+                <a:shade val="50000"/>
+              </a:schemeClr>
+            </a:lnRef>
+            <a:fillRef idx="1">
+              <a:schemeClr val="accent1"/>
+            </a:fillRef>
+            <a:effectRef idx="0">
+              <a:schemeClr val="accent1"/>
+            </a:effectRef>
+            <a:fontRef idx="minor">
+              <a:schemeClr val="lt1"/>
+            </a:fontRef>
+          </p:style>
+          <p:txBody>
+            <a:bodyPr rtlCol="0" anchor="ctr"/>
+            <a:lstStyle/>
+            <a:p>
+              <a:pPr algn="ctr"/>
+              <a:endParaRPr lang="en-GB"/>
+            </a:p>
+          </p:txBody>
+        </p:sp>
+        <p:sp>
+          <p:nvSpPr>
+            <p:cNvPr id="14" name="TextBox 13">
+              <a:extLst>
+                <a:ext uri="{FF2B5EF4-FFF2-40B4-BE49-F238E27FC236}">
+                  <a16:creationId xmlns:a16="http://schemas.microsoft.com/office/drawing/2014/main" id="{F95D510A-5576-458A-ABC3-D62CF72D98C5}"/>
+                </a:ext>
+              </a:extLst>
+            </p:cNvPr>
+            <p:cNvSpPr txBox="1"/>
+            <p:nvPr/>
+          </p:nvSpPr>
+          <p:spPr>
+            <a:xfrm rot="60630">
+              <a:off x="3572140" y="4080415"/>
+              <a:ext cx="461986" cy="707886"/>
+            </a:xfrm>
+            <a:prstGeom prst="rect">
+              <a:avLst/>
+            </a:prstGeom>
+            <a:noFill/>
+          </p:spPr>
+          <p:txBody>
+            <a:bodyPr wrap="none" rtlCol="0">
+              <a:spAutoFit/>
+            </a:bodyPr>
+            <a:lstStyle/>
+            <a:p>
+              <a:r>
+                <a:rPr lang="en-US" sz="4000" dirty="0">
+                  <a:latin typeface="Arvo" panose="02000000000000000000" pitchFamily="2" charset="0"/>
+                </a:rPr>
+                <a:t>3</a:t>
+              </a:r>
+              <a:endParaRPr lang="en-GB" sz="4000" dirty="0">
+                <a:latin typeface="Arvo" panose="02000000000000000000" pitchFamily="2" charset="0"/>
+              </a:endParaRPr>
+            </a:p>
+          </p:txBody>
+        </p:sp>
+      </p:grpSp>
+    </p:spTree>
+    <p:extLst>
+      <p:ext uri="{BB962C8B-B14F-4D97-AF65-F5344CB8AC3E}">
+        <p14:creationId xmlns:p14="http://schemas.microsoft.com/office/powerpoint/2010/main" val="232540938"/>
+      </p:ext>
+    </p:extLst>
+  </p:cSld>
+  <p:clrMapOvr>
+    <a:masterClrMapping/>
+  </p:clrMapOvr>
+</p:sld>
+</file>
+
 <file path=ppt/theme/theme1.xml><?xml version="1.0" encoding="utf-8"?>
 <a:theme xmlns:a="http://schemas.openxmlformats.org/drawingml/2006/main" name="Office Theme">
   <a:themeElements>

</xml_diff>

<commit_message>
update version control image quality
</commit_message>
<xml_diff>
--- a/source/_images/editables.pptx
+++ b/source/_images/editables.pptx
@@ -8,6 +8,7 @@
     <p:sldId id="256" r:id="rId2"/>
     <p:sldId id="257" r:id="rId3"/>
     <p:sldId id="258" r:id="rId4"/>
+    <p:sldId id="259" r:id="rId5"/>
   </p:sldIdLst>
   <p:sldSz cx="12192000" cy="6858000"/>
   <p:notesSz cx="6858000" cy="9144000"/>
@@ -4775,6 +4776,72 @@
 </p:sld>
 </file>
 
+<file path=ppt/slides/slide4.xml><?xml version="1.0" encoding="utf-8"?>
+<p:sld xmlns:a="http://schemas.openxmlformats.org/drawingml/2006/main" xmlns:r="http://schemas.openxmlformats.org/officeDocument/2006/relationships" xmlns:p="http://schemas.openxmlformats.org/presentationml/2006/main">
+  <p:cSld>
+    <p:spTree>
+      <p:nvGrpSpPr>
+        <p:cNvPr id="1" name=""/>
+        <p:cNvGrpSpPr/>
+        <p:nvPr/>
+      </p:nvGrpSpPr>
+      <p:grpSpPr>
+        <a:xfrm>
+          <a:off x="0" y="0"/>
+          <a:ext cx="0" cy="0"/>
+          <a:chOff x="0" y="0"/>
+          <a:chExt cx="0" cy="0"/>
+        </a:xfrm>
+      </p:grpSpPr>
+      <p:pic>
+        <p:nvPicPr>
+          <p:cNvPr id="5" name="Picture 4" descr="A screenshot of a computer&#10;&#10;Description automatically generated with medium confidence">
+            <a:extLst>
+              <a:ext uri="{FF2B5EF4-FFF2-40B4-BE49-F238E27FC236}">
+                <a16:creationId xmlns:a16="http://schemas.microsoft.com/office/drawing/2014/main" id="{FF95FE21-7B3F-4D92-9752-CC78B2EA6F23}"/>
+              </a:ext>
+            </a:extLst>
+          </p:cNvPr>
+          <p:cNvPicPr>
+            <a:picLocks noChangeAspect="1"/>
+          </p:cNvPicPr>
+          <p:nvPr/>
+        </p:nvPicPr>
+        <p:blipFill>
+          <a:blip r:embed="rId2">
+            <a:extLst>
+              <a:ext uri="{28A0092B-C50C-407E-A947-70E740481C1C}">
+                <a14:useLocalDpi xmlns:a14="http://schemas.microsoft.com/office/drawing/2010/main" val="0"/>
+              </a:ext>
+            </a:extLst>
+          </a:blip>
+          <a:stretch>
+            <a:fillRect/>
+          </a:stretch>
+        </p:blipFill>
+        <p:spPr>
+          <a:xfrm>
+            <a:off x="1569652" y="879157"/>
+            <a:ext cx="9052695" cy="5099685"/>
+          </a:xfrm>
+          <a:prstGeom prst="rect">
+            <a:avLst/>
+          </a:prstGeom>
+        </p:spPr>
+      </p:pic>
+    </p:spTree>
+    <p:extLst>
+      <p:ext uri="{BB962C8B-B14F-4D97-AF65-F5344CB8AC3E}">
+        <p14:creationId xmlns:p14="http://schemas.microsoft.com/office/powerpoint/2010/main" val="2799062895"/>
+      </p:ext>
+    </p:extLst>
+  </p:cSld>
+  <p:clrMapOvr>
+    <a:masterClrMapping/>
+  </p:clrMapOvr>
+</p:sld>
+</file>
+
 <file path=ppt/theme/theme1.xml><?xml version="1.0" encoding="utf-8"?>
 <a:theme xmlns:a="http://schemas.openxmlformats.org/drawingml/2006/main" name="Office Theme">
   <a:themeElements>

</xml_diff>

<commit_message>
update landing pages to show new events
</commit_message>
<xml_diff>
--- a/source/_images/editables.pptx
+++ b/source/_images/editables.pptx
@@ -9,6 +9,10 @@
     <p:sldId id="257" r:id="rId3"/>
     <p:sldId id="258" r:id="rId4"/>
     <p:sldId id="259" r:id="rId5"/>
+    <p:sldId id="260" r:id="rId6"/>
+    <p:sldId id="261" r:id="rId7"/>
+    <p:sldId id="262" r:id="rId8"/>
+    <p:sldId id="263" r:id="rId9"/>
   </p:sldIdLst>
   <p:sldSz cx="12192000" cy="6858000"/>
   <p:notesSz cx="6858000" cy="9144000"/>
@@ -4842,6 +4846,2916 @@
 </p:sld>
 </file>
 
+<file path=ppt/slides/slide5.xml><?xml version="1.0" encoding="utf-8"?>
+<p:sld xmlns:a="http://schemas.openxmlformats.org/drawingml/2006/main" xmlns:r="http://schemas.openxmlformats.org/officeDocument/2006/relationships" xmlns:p="http://schemas.openxmlformats.org/presentationml/2006/main">
+  <p:cSld>
+    <p:spTree>
+      <p:nvGrpSpPr>
+        <p:cNvPr id="1" name=""/>
+        <p:cNvGrpSpPr/>
+        <p:nvPr/>
+      </p:nvGrpSpPr>
+      <p:grpSpPr>
+        <a:xfrm>
+          <a:off x="0" y="0"/>
+          <a:ext cx="0" cy="0"/>
+          <a:chOff x="0" y="0"/>
+          <a:chExt cx="0" cy="0"/>
+        </a:xfrm>
+      </p:grpSpPr>
+      <p:pic>
+        <p:nvPicPr>
+          <p:cNvPr id="7" name="Picture 6" descr="Graphical user interface, application&#10;&#10;Description automatically generated">
+            <a:extLst>
+              <a:ext uri="{FF2B5EF4-FFF2-40B4-BE49-F238E27FC236}">
+                <a16:creationId xmlns:a16="http://schemas.microsoft.com/office/drawing/2014/main" id="{276876AD-D7D5-47B1-A6E1-61BEAE764F34}"/>
+              </a:ext>
+            </a:extLst>
+          </p:cNvPr>
+          <p:cNvPicPr>
+            <a:picLocks noChangeAspect="1"/>
+          </p:cNvPicPr>
+          <p:nvPr/>
+        </p:nvPicPr>
+        <p:blipFill rotWithShape="1">
+          <a:blip r:embed="rId2">
+            <a:extLst>
+              <a:ext uri="{28A0092B-C50C-407E-A947-70E740481C1C}">
+                <a14:useLocalDpi xmlns:a14="http://schemas.microsoft.com/office/drawing/2010/main" val="0"/>
+              </a:ext>
+            </a:extLst>
+          </a:blip>
+          <a:srcRect t="7807" r="12065"/>
+          <a:stretch/>
+        </p:blipFill>
+        <p:spPr>
+          <a:xfrm>
+            <a:off x="6211195" y="4851400"/>
+            <a:ext cx="2060739" cy="869486"/>
+          </a:xfrm>
+          <a:prstGeom prst="rect">
+            <a:avLst/>
+          </a:prstGeom>
+          <a:ln>
+            <a:noFill/>
+          </a:ln>
+          <a:effectLst>
+            <a:outerShdw blurRad="292100" dist="139700" dir="2700000" algn="tl" rotWithShape="0">
+              <a:srgbClr val="333333">
+                <a:alpha val="65000"/>
+              </a:srgbClr>
+            </a:outerShdw>
+          </a:effectLst>
+        </p:spPr>
+      </p:pic>
+      <p:pic>
+        <p:nvPicPr>
+          <p:cNvPr id="9" name="Picture 8" descr="Graphical user interface, text, application, email&#10;&#10;Description automatically generated">
+            <a:extLst>
+              <a:ext uri="{FF2B5EF4-FFF2-40B4-BE49-F238E27FC236}">
+                <a16:creationId xmlns:a16="http://schemas.microsoft.com/office/drawing/2014/main" id="{0B799F3A-C11B-48D4-BCAA-11BA90F90DFF}"/>
+              </a:ext>
+            </a:extLst>
+          </p:cNvPr>
+          <p:cNvPicPr>
+            <a:picLocks noChangeAspect="1"/>
+          </p:cNvPicPr>
+          <p:nvPr/>
+        </p:nvPicPr>
+        <p:blipFill>
+          <a:blip r:embed="rId3">
+            <a:extLst>
+              <a:ext uri="{28A0092B-C50C-407E-A947-70E740481C1C}">
+                <a14:useLocalDpi xmlns:a14="http://schemas.microsoft.com/office/drawing/2010/main" val="0"/>
+              </a:ext>
+            </a:extLst>
+          </a:blip>
+          <a:stretch>
+            <a:fillRect/>
+          </a:stretch>
+        </p:blipFill>
+        <p:spPr>
+          <a:xfrm>
+            <a:off x="3535817" y="635001"/>
+            <a:ext cx="6954384" cy="3456698"/>
+          </a:xfrm>
+          <a:prstGeom prst="rect">
+            <a:avLst/>
+          </a:prstGeom>
+          <a:ln>
+            <a:noFill/>
+          </a:ln>
+          <a:effectLst>
+            <a:outerShdw blurRad="292100" dist="139700" dir="2700000" algn="tl" rotWithShape="0">
+              <a:srgbClr val="333333">
+                <a:alpha val="65000"/>
+              </a:srgbClr>
+            </a:outerShdw>
+          </a:effectLst>
+        </p:spPr>
+      </p:pic>
+    </p:spTree>
+    <p:extLst>
+      <p:ext uri="{BB962C8B-B14F-4D97-AF65-F5344CB8AC3E}">
+        <p14:creationId xmlns:p14="http://schemas.microsoft.com/office/powerpoint/2010/main" val="4048349628"/>
+      </p:ext>
+    </p:extLst>
+  </p:cSld>
+  <p:clrMapOvr>
+    <a:masterClrMapping/>
+  </p:clrMapOvr>
+</p:sld>
+</file>
+
+<file path=ppt/slides/slide6.xml><?xml version="1.0" encoding="utf-8"?>
+<p:sld xmlns:a="http://schemas.openxmlformats.org/drawingml/2006/main" xmlns:r="http://schemas.openxmlformats.org/officeDocument/2006/relationships" xmlns:p="http://schemas.openxmlformats.org/presentationml/2006/main">
+  <p:cSld>
+    <p:spTree>
+      <p:nvGrpSpPr>
+        <p:cNvPr id="1" name=""/>
+        <p:cNvGrpSpPr/>
+        <p:nvPr/>
+      </p:nvGrpSpPr>
+      <p:grpSpPr>
+        <a:xfrm>
+          <a:off x="0" y="0"/>
+          <a:ext cx="0" cy="0"/>
+          <a:chOff x="0" y="0"/>
+          <a:chExt cx="0" cy="0"/>
+        </a:xfrm>
+      </p:grpSpPr>
+      <p:grpSp>
+        <p:nvGrpSpPr>
+          <p:cNvPr id="15" name="Group 14">
+            <a:extLst>
+              <a:ext uri="{FF2B5EF4-FFF2-40B4-BE49-F238E27FC236}">
+                <a16:creationId xmlns:a16="http://schemas.microsoft.com/office/drawing/2014/main" id="{3AD43EFF-78E5-49C1-9570-BEAF9289568D}"/>
+              </a:ext>
+            </a:extLst>
+          </p:cNvPr>
+          <p:cNvGrpSpPr/>
+          <p:nvPr/>
+        </p:nvGrpSpPr>
+        <p:grpSpPr>
+          <a:xfrm>
+            <a:off x="431965" y="823383"/>
+            <a:ext cx="8862328" cy="5231140"/>
+            <a:chOff x="431965" y="823383"/>
+            <a:chExt cx="8862328" cy="5231140"/>
+          </a:xfrm>
+        </p:grpSpPr>
+        <p:pic>
+          <p:nvPicPr>
+            <p:cNvPr id="5" name="Picture 4" descr="A picture containing text, screenshot, indoor&#10;&#10;Description automatically generated">
+              <a:extLst>
+                <a:ext uri="{FF2B5EF4-FFF2-40B4-BE49-F238E27FC236}">
+                  <a16:creationId xmlns:a16="http://schemas.microsoft.com/office/drawing/2014/main" id="{7A8A1C42-7FC4-4A13-9DE6-BA4CA87AC0A5}"/>
+                </a:ext>
+              </a:extLst>
+            </p:cNvPr>
+            <p:cNvPicPr>
+              <a:picLocks noChangeAspect="1"/>
+            </p:cNvPicPr>
+            <p:nvPr/>
+          </p:nvPicPr>
+          <p:blipFill>
+            <a:blip r:embed="rId2">
+              <a:extLst>
+                <a:ext uri="{28A0092B-C50C-407E-A947-70E740481C1C}">
+                  <a14:useLocalDpi xmlns:a14="http://schemas.microsoft.com/office/drawing/2010/main" val="0"/>
+                </a:ext>
+              </a:extLst>
+            </a:blip>
+            <a:stretch>
+              <a:fillRect/>
+            </a:stretch>
+          </p:blipFill>
+          <p:spPr>
+            <a:xfrm>
+              <a:off x="431965" y="823383"/>
+              <a:ext cx="8862328" cy="5211233"/>
+            </a:xfrm>
+            <a:prstGeom prst="rect">
+              <a:avLst/>
+            </a:prstGeom>
+            <a:ln>
+              <a:noFill/>
+            </a:ln>
+            <a:effectLst>
+              <a:outerShdw blurRad="292100" dist="139700" dir="2700000" algn="tl" rotWithShape="0">
+                <a:srgbClr val="333333">
+                  <a:alpha val="65000"/>
+                </a:srgbClr>
+              </a:outerShdw>
+            </a:effectLst>
+          </p:spPr>
+        </p:pic>
+        <p:sp>
+          <p:nvSpPr>
+            <p:cNvPr id="6" name="Arrow: Down 5">
+              <a:extLst>
+                <a:ext uri="{FF2B5EF4-FFF2-40B4-BE49-F238E27FC236}">
+                  <a16:creationId xmlns:a16="http://schemas.microsoft.com/office/drawing/2014/main" id="{495CA5E0-9090-4985-8CD3-EF9DB711A710}"/>
+                </a:ext>
+              </a:extLst>
+            </p:cNvPr>
+            <p:cNvSpPr/>
+            <p:nvPr/>
+          </p:nvSpPr>
+          <p:spPr>
+            <a:xfrm rot="7571762">
+              <a:off x="4950059" y="1080950"/>
+              <a:ext cx="309325" cy="1236518"/>
+            </a:xfrm>
+            <a:prstGeom prst="downArrow">
+              <a:avLst/>
+            </a:prstGeom>
+            <a:solidFill>
+              <a:srgbClr val="FF0000"/>
+            </a:solidFill>
+            <a:ln>
+              <a:solidFill>
+                <a:srgbClr val="FF0000"/>
+              </a:solidFill>
+            </a:ln>
+          </p:spPr>
+          <p:style>
+            <a:lnRef idx="2">
+              <a:schemeClr val="accent1">
+                <a:shade val="50000"/>
+              </a:schemeClr>
+            </a:lnRef>
+            <a:fillRef idx="1">
+              <a:schemeClr val="accent1"/>
+            </a:fillRef>
+            <a:effectRef idx="0">
+              <a:schemeClr val="accent1"/>
+            </a:effectRef>
+            <a:fontRef idx="minor">
+              <a:schemeClr val="lt1"/>
+            </a:fontRef>
+          </p:style>
+          <p:txBody>
+            <a:bodyPr rtlCol="0" anchor="ctr"/>
+            <a:lstStyle/>
+            <a:p>
+              <a:pPr algn="ctr"/>
+              <a:endParaRPr lang="en-GB"/>
+            </a:p>
+          </p:txBody>
+        </p:sp>
+        <p:sp>
+          <p:nvSpPr>
+            <p:cNvPr id="7" name="Oval 6">
+              <a:extLst>
+                <a:ext uri="{FF2B5EF4-FFF2-40B4-BE49-F238E27FC236}">
+                  <a16:creationId xmlns:a16="http://schemas.microsoft.com/office/drawing/2014/main" id="{696A2FCE-9567-43CA-96AD-8B0ED278E434}"/>
+                </a:ext>
+              </a:extLst>
+            </p:cNvPr>
+            <p:cNvSpPr/>
+            <p:nvPr/>
+          </p:nvSpPr>
+          <p:spPr>
+            <a:xfrm rot="60630">
+              <a:off x="5528456" y="1884869"/>
+              <a:ext cx="757645" cy="703336"/>
+            </a:xfrm>
+            <a:prstGeom prst="ellipse">
+              <a:avLst/>
+            </a:prstGeom>
+            <a:solidFill>
+              <a:schemeClr val="bg1"/>
+            </a:solidFill>
+            <a:ln w="28575">
+              <a:solidFill>
+                <a:srgbClr val="FF0000"/>
+              </a:solidFill>
+            </a:ln>
+          </p:spPr>
+          <p:style>
+            <a:lnRef idx="2">
+              <a:schemeClr val="accent1">
+                <a:shade val="50000"/>
+              </a:schemeClr>
+            </a:lnRef>
+            <a:fillRef idx="1">
+              <a:schemeClr val="accent1"/>
+            </a:fillRef>
+            <a:effectRef idx="0">
+              <a:schemeClr val="accent1"/>
+            </a:effectRef>
+            <a:fontRef idx="minor">
+              <a:schemeClr val="lt1"/>
+            </a:fontRef>
+          </p:style>
+          <p:txBody>
+            <a:bodyPr rtlCol="0" anchor="ctr"/>
+            <a:lstStyle/>
+            <a:p>
+              <a:pPr algn="ctr"/>
+              <a:endParaRPr lang="en-GB"/>
+            </a:p>
+          </p:txBody>
+        </p:sp>
+        <p:sp>
+          <p:nvSpPr>
+            <p:cNvPr id="8" name="TextBox 7">
+              <a:extLst>
+                <a:ext uri="{FF2B5EF4-FFF2-40B4-BE49-F238E27FC236}">
+                  <a16:creationId xmlns:a16="http://schemas.microsoft.com/office/drawing/2014/main" id="{DB029447-041A-4291-9873-A24FFB70576C}"/>
+                </a:ext>
+              </a:extLst>
+            </p:cNvPr>
+            <p:cNvSpPr txBox="1"/>
+            <p:nvPr/>
+          </p:nvSpPr>
+          <p:spPr>
+            <a:xfrm rot="60630">
+              <a:off x="5707544" y="1882594"/>
+              <a:ext cx="399468" cy="707886"/>
+            </a:xfrm>
+            <a:prstGeom prst="rect">
+              <a:avLst/>
+            </a:prstGeom>
+            <a:noFill/>
+          </p:spPr>
+          <p:txBody>
+            <a:bodyPr wrap="none" rtlCol="0">
+              <a:spAutoFit/>
+            </a:bodyPr>
+            <a:lstStyle/>
+            <a:p>
+              <a:r>
+                <a:rPr lang="en-US" sz="4000" dirty="0">
+                  <a:latin typeface="Arvo" panose="02000000000000000000" pitchFamily="2" charset="0"/>
+                </a:rPr>
+                <a:t>1</a:t>
+              </a:r>
+              <a:endParaRPr lang="en-GB" sz="4000" dirty="0">
+                <a:latin typeface="Arvo" panose="02000000000000000000" pitchFamily="2" charset="0"/>
+              </a:endParaRPr>
+            </a:p>
+          </p:txBody>
+        </p:sp>
+        <p:sp>
+          <p:nvSpPr>
+            <p:cNvPr id="9" name="Arrow: Down 8">
+              <a:extLst>
+                <a:ext uri="{FF2B5EF4-FFF2-40B4-BE49-F238E27FC236}">
+                  <a16:creationId xmlns:a16="http://schemas.microsoft.com/office/drawing/2014/main" id="{51465F80-53D3-4325-8C69-5C0FC1073482}"/>
+                </a:ext>
+              </a:extLst>
+            </p:cNvPr>
+            <p:cNvSpPr/>
+            <p:nvPr/>
+          </p:nvSpPr>
+          <p:spPr>
+            <a:xfrm rot="7571762">
+              <a:off x="2549366" y="1744590"/>
+              <a:ext cx="309325" cy="1236518"/>
+            </a:xfrm>
+            <a:prstGeom prst="downArrow">
+              <a:avLst/>
+            </a:prstGeom>
+            <a:solidFill>
+              <a:srgbClr val="FF0000"/>
+            </a:solidFill>
+            <a:ln>
+              <a:solidFill>
+                <a:srgbClr val="FF0000"/>
+              </a:solidFill>
+            </a:ln>
+          </p:spPr>
+          <p:style>
+            <a:lnRef idx="2">
+              <a:schemeClr val="accent1">
+                <a:shade val="50000"/>
+              </a:schemeClr>
+            </a:lnRef>
+            <a:fillRef idx="1">
+              <a:schemeClr val="accent1"/>
+            </a:fillRef>
+            <a:effectRef idx="0">
+              <a:schemeClr val="accent1"/>
+            </a:effectRef>
+            <a:fontRef idx="minor">
+              <a:schemeClr val="lt1"/>
+            </a:fontRef>
+          </p:style>
+          <p:txBody>
+            <a:bodyPr rtlCol="0" anchor="ctr"/>
+            <a:lstStyle/>
+            <a:p>
+              <a:pPr algn="ctr"/>
+              <a:endParaRPr lang="en-GB"/>
+            </a:p>
+          </p:txBody>
+        </p:sp>
+        <p:sp>
+          <p:nvSpPr>
+            <p:cNvPr id="10" name="Oval 9">
+              <a:extLst>
+                <a:ext uri="{FF2B5EF4-FFF2-40B4-BE49-F238E27FC236}">
+                  <a16:creationId xmlns:a16="http://schemas.microsoft.com/office/drawing/2014/main" id="{9BD05C70-F433-4D84-845C-6CC0BC3976BB}"/>
+                </a:ext>
+              </a:extLst>
+            </p:cNvPr>
+            <p:cNvSpPr/>
+            <p:nvPr/>
+          </p:nvSpPr>
+          <p:spPr>
+            <a:xfrm rot="60630">
+              <a:off x="3127763" y="2548509"/>
+              <a:ext cx="757645" cy="703336"/>
+            </a:xfrm>
+            <a:prstGeom prst="ellipse">
+              <a:avLst/>
+            </a:prstGeom>
+            <a:solidFill>
+              <a:schemeClr val="bg1"/>
+            </a:solidFill>
+            <a:ln w="28575">
+              <a:solidFill>
+                <a:srgbClr val="FF0000"/>
+              </a:solidFill>
+            </a:ln>
+          </p:spPr>
+          <p:style>
+            <a:lnRef idx="2">
+              <a:schemeClr val="accent1">
+                <a:shade val="50000"/>
+              </a:schemeClr>
+            </a:lnRef>
+            <a:fillRef idx="1">
+              <a:schemeClr val="accent1"/>
+            </a:fillRef>
+            <a:effectRef idx="0">
+              <a:schemeClr val="accent1"/>
+            </a:effectRef>
+            <a:fontRef idx="minor">
+              <a:schemeClr val="lt1"/>
+            </a:fontRef>
+          </p:style>
+          <p:txBody>
+            <a:bodyPr rtlCol="0" anchor="ctr"/>
+            <a:lstStyle/>
+            <a:p>
+              <a:pPr algn="ctr"/>
+              <a:endParaRPr lang="en-GB"/>
+            </a:p>
+          </p:txBody>
+        </p:sp>
+        <p:sp>
+          <p:nvSpPr>
+            <p:cNvPr id="11" name="TextBox 10">
+              <a:extLst>
+                <a:ext uri="{FF2B5EF4-FFF2-40B4-BE49-F238E27FC236}">
+                  <a16:creationId xmlns:a16="http://schemas.microsoft.com/office/drawing/2014/main" id="{D34DF092-7AC0-4DE1-BF77-99EEF40F1518}"/>
+                </a:ext>
+              </a:extLst>
+            </p:cNvPr>
+            <p:cNvSpPr txBox="1"/>
+            <p:nvPr/>
+          </p:nvSpPr>
+          <p:spPr>
+            <a:xfrm rot="60630">
+              <a:off x="3276394" y="2546234"/>
+              <a:ext cx="460382" cy="707886"/>
+            </a:xfrm>
+            <a:prstGeom prst="rect">
+              <a:avLst/>
+            </a:prstGeom>
+            <a:noFill/>
+          </p:spPr>
+          <p:txBody>
+            <a:bodyPr wrap="none" rtlCol="0">
+              <a:spAutoFit/>
+            </a:bodyPr>
+            <a:lstStyle/>
+            <a:p>
+              <a:r>
+                <a:rPr lang="en-US" sz="4000" dirty="0">
+                  <a:latin typeface="Arvo" panose="02000000000000000000" pitchFamily="2" charset="0"/>
+                </a:rPr>
+                <a:t>2</a:t>
+              </a:r>
+              <a:endParaRPr lang="en-GB" sz="4000" dirty="0">
+                <a:latin typeface="Arvo" panose="02000000000000000000" pitchFamily="2" charset="0"/>
+              </a:endParaRPr>
+            </a:p>
+          </p:txBody>
+        </p:sp>
+        <p:sp>
+          <p:nvSpPr>
+            <p:cNvPr id="12" name="Arrow: Down 11">
+              <a:extLst>
+                <a:ext uri="{FF2B5EF4-FFF2-40B4-BE49-F238E27FC236}">
+                  <a16:creationId xmlns:a16="http://schemas.microsoft.com/office/drawing/2014/main" id="{0D718A79-2EAF-477F-BAE3-B42A385D1CC3}"/>
+                </a:ext>
+              </a:extLst>
+            </p:cNvPr>
+            <p:cNvSpPr/>
+            <p:nvPr/>
+          </p:nvSpPr>
+          <p:spPr>
+            <a:xfrm rot="7571762">
+              <a:off x="4565092" y="4544993"/>
+              <a:ext cx="309325" cy="1236518"/>
+            </a:xfrm>
+            <a:prstGeom prst="downArrow">
+              <a:avLst/>
+            </a:prstGeom>
+            <a:solidFill>
+              <a:srgbClr val="FF0000"/>
+            </a:solidFill>
+            <a:ln>
+              <a:solidFill>
+                <a:srgbClr val="FF0000"/>
+              </a:solidFill>
+            </a:ln>
+          </p:spPr>
+          <p:style>
+            <a:lnRef idx="2">
+              <a:schemeClr val="accent1">
+                <a:shade val="50000"/>
+              </a:schemeClr>
+            </a:lnRef>
+            <a:fillRef idx="1">
+              <a:schemeClr val="accent1"/>
+            </a:fillRef>
+            <a:effectRef idx="0">
+              <a:schemeClr val="accent1"/>
+            </a:effectRef>
+            <a:fontRef idx="minor">
+              <a:schemeClr val="lt1"/>
+            </a:fontRef>
+          </p:style>
+          <p:txBody>
+            <a:bodyPr rtlCol="0" anchor="ctr"/>
+            <a:lstStyle/>
+            <a:p>
+              <a:pPr algn="ctr"/>
+              <a:endParaRPr lang="en-GB"/>
+            </a:p>
+          </p:txBody>
+        </p:sp>
+        <p:sp>
+          <p:nvSpPr>
+            <p:cNvPr id="13" name="Oval 12">
+              <a:extLst>
+                <a:ext uri="{FF2B5EF4-FFF2-40B4-BE49-F238E27FC236}">
+                  <a16:creationId xmlns:a16="http://schemas.microsoft.com/office/drawing/2014/main" id="{8FC4FC82-7494-49BE-8C9D-DE5A7821705D}"/>
+                </a:ext>
+              </a:extLst>
+            </p:cNvPr>
+            <p:cNvSpPr/>
+            <p:nvPr/>
+          </p:nvSpPr>
+          <p:spPr>
+            <a:xfrm rot="60630">
+              <a:off x="5143489" y="5348912"/>
+              <a:ext cx="757645" cy="703336"/>
+            </a:xfrm>
+            <a:prstGeom prst="ellipse">
+              <a:avLst/>
+            </a:prstGeom>
+            <a:solidFill>
+              <a:schemeClr val="bg1"/>
+            </a:solidFill>
+            <a:ln w="28575">
+              <a:solidFill>
+                <a:srgbClr val="FF0000"/>
+              </a:solidFill>
+            </a:ln>
+          </p:spPr>
+          <p:style>
+            <a:lnRef idx="2">
+              <a:schemeClr val="accent1">
+                <a:shade val="50000"/>
+              </a:schemeClr>
+            </a:lnRef>
+            <a:fillRef idx="1">
+              <a:schemeClr val="accent1"/>
+            </a:fillRef>
+            <a:effectRef idx="0">
+              <a:schemeClr val="accent1"/>
+            </a:effectRef>
+            <a:fontRef idx="minor">
+              <a:schemeClr val="lt1"/>
+            </a:fontRef>
+          </p:style>
+          <p:txBody>
+            <a:bodyPr rtlCol="0" anchor="ctr"/>
+            <a:lstStyle/>
+            <a:p>
+              <a:pPr algn="ctr"/>
+              <a:endParaRPr lang="en-GB"/>
+            </a:p>
+          </p:txBody>
+        </p:sp>
+        <p:sp>
+          <p:nvSpPr>
+            <p:cNvPr id="14" name="TextBox 13">
+              <a:extLst>
+                <a:ext uri="{FF2B5EF4-FFF2-40B4-BE49-F238E27FC236}">
+                  <a16:creationId xmlns:a16="http://schemas.microsoft.com/office/drawing/2014/main" id="{4D812CDB-3213-4ABF-920B-9FCC7E661D6B}"/>
+                </a:ext>
+              </a:extLst>
+            </p:cNvPr>
+            <p:cNvSpPr txBox="1"/>
+            <p:nvPr/>
+          </p:nvSpPr>
+          <p:spPr>
+            <a:xfrm rot="60630">
+              <a:off x="5291318" y="5346637"/>
+              <a:ext cx="461986" cy="707886"/>
+            </a:xfrm>
+            <a:prstGeom prst="rect">
+              <a:avLst/>
+            </a:prstGeom>
+            <a:noFill/>
+          </p:spPr>
+          <p:txBody>
+            <a:bodyPr wrap="none" rtlCol="0">
+              <a:spAutoFit/>
+            </a:bodyPr>
+            <a:lstStyle/>
+            <a:p>
+              <a:r>
+                <a:rPr lang="en-US" sz="4000" dirty="0">
+                  <a:latin typeface="Arvo" panose="02000000000000000000" pitchFamily="2" charset="0"/>
+                </a:rPr>
+                <a:t>3</a:t>
+              </a:r>
+              <a:endParaRPr lang="en-GB" sz="4000" dirty="0">
+                <a:latin typeface="Arvo" panose="02000000000000000000" pitchFamily="2" charset="0"/>
+              </a:endParaRPr>
+            </a:p>
+          </p:txBody>
+        </p:sp>
+      </p:grpSp>
+    </p:spTree>
+    <p:extLst>
+      <p:ext uri="{BB962C8B-B14F-4D97-AF65-F5344CB8AC3E}">
+        <p14:creationId xmlns:p14="http://schemas.microsoft.com/office/powerpoint/2010/main" val="1292209845"/>
+      </p:ext>
+    </p:extLst>
+  </p:cSld>
+  <p:clrMapOvr>
+    <a:masterClrMapping/>
+  </p:clrMapOvr>
+</p:sld>
+</file>
+
+<file path=ppt/slides/slide7.xml><?xml version="1.0" encoding="utf-8"?>
+<p:sld xmlns:a="http://schemas.openxmlformats.org/drawingml/2006/main" xmlns:r="http://schemas.openxmlformats.org/officeDocument/2006/relationships" xmlns:p="http://schemas.openxmlformats.org/presentationml/2006/main">
+  <p:cSld>
+    <p:spTree>
+      <p:nvGrpSpPr>
+        <p:cNvPr id="1" name=""/>
+        <p:cNvGrpSpPr/>
+        <p:nvPr/>
+      </p:nvGrpSpPr>
+      <p:grpSpPr>
+        <a:xfrm>
+          <a:off x="0" y="0"/>
+          <a:ext cx="0" cy="0"/>
+          <a:chOff x="0" y="0"/>
+          <a:chExt cx="0" cy="0"/>
+        </a:xfrm>
+      </p:grpSpPr>
+      <p:grpSp>
+        <p:nvGrpSpPr>
+          <p:cNvPr id="41" name="Group 40">
+            <a:extLst>
+              <a:ext uri="{FF2B5EF4-FFF2-40B4-BE49-F238E27FC236}">
+                <a16:creationId xmlns:a16="http://schemas.microsoft.com/office/drawing/2014/main" id="{F6F13205-03D2-4E28-9121-ED11DD72722D}"/>
+              </a:ext>
+            </a:extLst>
+          </p:cNvPr>
+          <p:cNvGrpSpPr/>
+          <p:nvPr/>
+        </p:nvGrpSpPr>
+        <p:grpSpPr>
+          <a:xfrm>
+            <a:off x="1979601" y="720586"/>
+            <a:ext cx="7855354" cy="5416828"/>
+            <a:chOff x="1979601" y="720586"/>
+            <a:chExt cx="7855354" cy="5416828"/>
+          </a:xfrm>
+        </p:grpSpPr>
+        <p:pic>
+          <p:nvPicPr>
+            <p:cNvPr id="17" name="Picture 16" descr="A screenshot of a computer&#10;&#10;Description automatically generated with medium confidence">
+              <a:extLst>
+                <a:ext uri="{FF2B5EF4-FFF2-40B4-BE49-F238E27FC236}">
+                  <a16:creationId xmlns:a16="http://schemas.microsoft.com/office/drawing/2014/main" id="{871D7647-2FB5-4537-9039-090EC80430D7}"/>
+                </a:ext>
+              </a:extLst>
+            </p:cNvPr>
+            <p:cNvPicPr>
+              <a:picLocks noChangeAspect="1"/>
+            </p:cNvPicPr>
+            <p:nvPr/>
+          </p:nvPicPr>
+          <p:blipFill>
+            <a:blip r:embed="rId2">
+              <a:extLst>
+                <a:ext uri="{28A0092B-C50C-407E-A947-70E740481C1C}">
+                  <a14:useLocalDpi xmlns:a14="http://schemas.microsoft.com/office/drawing/2010/main" val="0"/>
+                </a:ext>
+              </a:extLst>
+            </a:blip>
+            <a:stretch>
+              <a:fillRect/>
+            </a:stretch>
+          </p:blipFill>
+          <p:spPr>
+            <a:xfrm>
+              <a:off x="1979601" y="720586"/>
+              <a:ext cx="7855354" cy="5416828"/>
+            </a:xfrm>
+            <a:prstGeom prst="rect">
+              <a:avLst/>
+            </a:prstGeom>
+            <a:ln>
+              <a:noFill/>
+            </a:ln>
+            <a:effectLst>
+              <a:outerShdw blurRad="292100" dist="139700" dir="2700000" algn="tl" rotWithShape="0">
+                <a:srgbClr val="333333">
+                  <a:alpha val="65000"/>
+                </a:srgbClr>
+              </a:outerShdw>
+            </a:effectLst>
+          </p:spPr>
+        </p:pic>
+        <p:sp>
+          <p:nvSpPr>
+            <p:cNvPr id="18" name="Arrow: Down 17">
+              <a:extLst>
+                <a:ext uri="{FF2B5EF4-FFF2-40B4-BE49-F238E27FC236}">
+                  <a16:creationId xmlns:a16="http://schemas.microsoft.com/office/drawing/2014/main" id="{3775AB08-3CFF-4B7B-9097-4DE59EF92020}"/>
+                </a:ext>
+              </a:extLst>
+            </p:cNvPr>
+            <p:cNvSpPr/>
+            <p:nvPr/>
+          </p:nvSpPr>
+          <p:spPr>
+            <a:xfrm rot="10800000">
+              <a:off x="3870824" y="4502659"/>
+              <a:ext cx="311708" cy="865208"/>
+            </a:xfrm>
+            <a:prstGeom prst="downArrow">
+              <a:avLst/>
+            </a:prstGeom>
+            <a:solidFill>
+              <a:srgbClr val="FF0000"/>
+            </a:solidFill>
+            <a:ln>
+              <a:solidFill>
+                <a:srgbClr val="FF0000"/>
+              </a:solidFill>
+            </a:ln>
+          </p:spPr>
+          <p:style>
+            <a:lnRef idx="2">
+              <a:schemeClr val="accent1">
+                <a:shade val="50000"/>
+              </a:schemeClr>
+            </a:lnRef>
+            <a:fillRef idx="1">
+              <a:schemeClr val="accent1"/>
+            </a:fillRef>
+            <a:effectRef idx="0">
+              <a:schemeClr val="accent1"/>
+            </a:effectRef>
+            <a:fontRef idx="minor">
+              <a:schemeClr val="lt1"/>
+            </a:fontRef>
+          </p:style>
+          <p:txBody>
+            <a:bodyPr rtlCol="0" anchor="ctr"/>
+            <a:lstStyle/>
+            <a:p>
+              <a:pPr algn="ctr"/>
+              <a:endParaRPr lang="en-GB"/>
+            </a:p>
+          </p:txBody>
+        </p:sp>
+        <p:sp>
+          <p:nvSpPr>
+            <p:cNvPr id="19" name="Oval 18">
+              <a:extLst>
+                <a:ext uri="{FF2B5EF4-FFF2-40B4-BE49-F238E27FC236}">
+                  <a16:creationId xmlns:a16="http://schemas.microsoft.com/office/drawing/2014/main" id="{E7053CC7-4323-4D02-82B1-D3B4408B6982}"/>
+                </a:ext>
+              </a:extLst>
+            </p:cNvPr>
+            <p:cNvSpPr/>
+            <p:nvPr/>
+          </p:nvSpPr>
+          <p:spPr>
+            <a:xfrm rot="60630">
+              <a:off x="3674258" y="4949629"/>
+              <a:ext cx="737993" cy="703336"/>
+            </a:xfrm>
+            <a:prstGeom prst="ellipse">
+              <a:avLst/>
+            </a:prstGeom>
+            <a:solidFill>
+              <a:schemeClr val="bg1"/>
+            </a:solidFill>
+            <a:ln w="28575">
+              <a:solidFill>
+                <a:srgbClr val="FF0000"/>
+              </a:solidFill>
+            </a:ln>
+          </p:spPr>
+          <p:style>
+            <a:lnRef idx="2">
+              <a:schemeClr val="accent1">
+                <a:shade val="50000"/>
+              </a:schemeClr>
+            </a:lnRef>
+            <a:fillRef idx="1">
+              <a:schemeClr val="accent1"/>
+            </a:fillRef>
+            <a:effectRef idx="0">
+              <a:schemeClr val="accent1"/>
+            </a:effectRef>
+            <a:fontRef idx="minor">
+              <a:schemeClr val="lt1"/>
+            </a:fontRef>
+          </p:style>
+          <p:txBody>
+            <a:bodyPr rtlCol="0" anchor="ctr"/>
+            <a:lstStyle/>
+            <a:p>
+              <a:pPr algn="ctr"/>
+              <a:endParaRPr lang="en-GB"/>
+            </a:p>
+          </p:txBody>
+        </p:sp>
+        <p:sp>
+          <p:nvSpPr>
+            <p:cNvPr id="20" name="TextBox 19">
+              <a:extLst>
+                <a:ext uri="{FF2B5EF4-FFF2-40B4-BE49-F238E27FC236}">
+                  <a16:creationId xmlns:a16="http://schemas.microsoft.com/office/drawing/2014/main" id="{2411955A-C803-4F11-9618-6E1665E8CBE6}"/>
+                </a:ext>
+              </a:extLst>
+            </p:cNvPr>
+            <p:cNvSpPr txBox="1"/>
+            <p:nvPr/>
+          </p:nvSpPr>
+          <p:spPr>
+            <a:xfrm rot="60630">
+              <a:off x="3844877" y="4947527"/>
+              <a:ext cx="399468" cy="707886"/>
+            </a:xfrm>
+            <a:prstGeom prst="rect">
+              <a:avLst/>
+            </a:prstGeom>
+            <a:noFill/>
+          </p:spPr>
+          <p:txBody>
+            <a:bodyPr wrap="none" rtlCol="0">
+              <a:spAutoFit/>
+            </a:bodyPr>
+            <a:lstStyle/>
+            <a:p>
+              <a:r>
+                <a:rPr lang="en-US" sz="4000" dirty="0">
+                  <a:latin typeface="Arvo" panose="02000000000000000000" pitchFamily="2" charset="0"/>
+                </a:rPr>
+                <a:t>1</a:t>
+              </a:r>
+              <a:endParaRPr lang="en-GB" sz="4000" dirty="0">
+                <a:latin typeface="Arvo" panose="02000000000000000000" pitchFamily="2" charset="0"/>
+              </a:endParaRPr>
+            </a:p>
+          </p:txBody>
+        </p:sp>
+        <p:sp>
+          <p:nvSpPr>
+            <p:cNvPr id="23" name="Arrow: Down 22">
+              <a:extLst>
+                <a:ext uri="{FF2B5EF4-FFF2-40B4-BE49-F238E27FC236}">
+                  <a16:creationId xmlns:a16="http://schemas.microsoft.com/office/drawing/2014/main" id="{D672BA17-4565-4173-9B85-7ACA82B5548E}"/>
+                </a:ext>
+              </a:extLst>
+            </p:cNvPr>
+            <p:cNvSpPr/>
+            <p:nvPr/>
+          </p:nvSpPr>
+          <p:spPr>
+            <a:xfrm rot="5248940">
+              <a:off x="4169730" y="2470659"/>
+              <a:ext cx="311708" cy="865208"/>
+            </a:xfrm>
+            <a:prstGeom prst="downArrow">
+              <a:avLst/>
+            </a:prstGeom>
+            <a:solidFill>
+              <a:srgbClr val="FF0000"/>
+            </a:solidFill>
+            <a:ln>
+              <a:solidFill>
+                <a:srgbClr val="FF0000"/>
+              </a:solidFill>
+            </a:ln>
+          </p:spPr>
+          <p:style>
+            <a:lnRef idx="2">
+              <a:schemeClr val="accent1">
+                <a:shade val="50000"/>
+              </a:schemeClr>
+            </a:lnRef>
+            <a:fillRef idx="1">
+              <a:schemeClr val="accent1"/>
+            </a:fillRef>
+            <a:effectRef idx="0">
+              <a:schemeClr val="accent1"/>
+            </a:effectRef>
+            <a:fontRef idx="minor">
+              <a:schemeClr val="lt1"/>
+            </a:fontRef>
+          </p:style>
+          <p:txBody>
+            <a:bodyPr rtlCol="0" anchor="ctr"/>
+            <a:lstStyle/>
+            <a:p>
+              <a:pPr algn="ctr"/>
+              <a:endParaRPr lang="en-GB"/>
+            </a:p>
+          </p:txBody>
+        </p:sp>
+        <p:sp>
+          <p:nvSpPr>
+            <p:cNvPr id="24" name="Oval 23">
+              <a:extLst>
+                <a:ext uri="{FF2B5EF4-FFF2-40B4-BE49-F238E27FC236}">
+                  <a16:creationId xmlns:a16="http://schemas.microsoft.com/office/drawing/2014/main" id="{01BCF093-9EB2-4512-856A-6276AA5137E6}"/>
+                </a:ext>
+              </a:extLst>
+            </p:cNvPr>
+            <p:cNvSpPr/>
+            <p:nvPr/>
+          </p:nvSpPr>
+          <p:spPr>
+            <a:xfrm rot="60630">
+              <a:off x="4419328" y="2536625"/>
+              <a:ext cx="737993" cy="703336"/>
+            </a:xfrm>
+            <a:prstGeom prst="ellipse">
+              <a:avLst/>
+            </a:prstGeom>
+            <a:solidFill>
+              <a:schemeClr val="bg1"/>
+            </a:solidFill>
+            <a:ln w="28575">
+              <a:solidFill>
+                <a:srgbClr val="FF0000"/>
+              </a:solidFill>
+            </a:ln>
+          </p:spPr>
+          <p:style>
+            <a:lnRef idx="2">
+              <a:schemeClr val="accent1">
+                <a:shade val="50000"/>
+              </a:schemeClr>
+            </a:lnRef>
+            <a:fillRef idx="1">
+              <a:schemeClr val="accent1"/>
+            </a:fillRef>
+            <a:effectRef idx="0">
+              <a:schemeClr val="accent1"/>
+            </a:effectRef>
+            <a:fontRef idx="minor">
+              <a:schemeClr val="lt1"/>
+            </a:fontRef>
+          </p:style>
+          <p:txBody>
+            <a:bodyPr rtlCol="0" anchor="ctr"/>
+            <a:lstStyle/>
+            <a:p>
+              <a:pPr algn="ctr"/>
+              <a:endParaRPr lang="en-GB"/>
+            </a:p>
+          </p:txBody>
+        </p:sp>
+        <p:sp>
+          <p:nvSpPr>
+            <p:cNvPr id="25" name="TextBox 24">
+              <a:extLst>
+                <a:ext uri="{FF2B5EF4-FFF2-40B4-BE49-F238E27FC236}">
+                  <a16:creationId xmlns:a16="http://schemas.microsoft.com/office/drawing/2014/main" id="{AF3AAF45-0024-41F3-8D23-2F376224D017}"/>
+                </a:ext>
+              </a:extLst>
+            </p:cNvPr>
+            <p:cNvSpPr txBox="1"/>
+            <p:nvPr/>
+          </p:nvSpPr>
+          <p:spPr>
+            <a:xfrm rot="60630">
+              <a:off x="4559490" y="2534523"/>
+              <a:ext cx="460382" cy="707886"/>
+            </a:xfrm>
+            <a:prstGeom prst="rect">
+              <a:avLst/>
+            </a:prstGeom>
+            <a:noFill/>
+          </p:spPr>
+          <p:txBody>
+            <a:bodyPr wrap="none" rtlCol="0">
+              <a:spAutoFit/>
+            </a:bodyPr>
+            <a:lstStyle/>
+            <a:p>
+              <a:r>
+                <a:rPr lang="en-US" sz="4000" dirty="0">
+                  <a:latin typeface="Arvo" panose="02000000000000000000" pitchFamily="2" charset="0"/>
+                </a:rPr>
+                <a:t>2</a:t>
+              </a:r>
+              <a:endParaRPr lang="en-GB" sz="4000" dirty="0">
+                <a:latin typeface="Arvo" panose="02000000000000000000" pitchFamily="2" charset="0"/>
+              </a:endParaRPr>
+            </a:p>
+          </p:txBody>
+        </p:sp>
+        <p:sp>
+          <p:nvSpPr>
+            <p:cNvPr id="26" name="Arrow: Down 25">
+              <a:extLst>
+                <a:ext uri="{FF2B5EF4-FFF2-40B4-BE49-F238E27FC236}">
+                  <a16:creationId xmlns:a16="http://schemas.microsoft.com/office/drawing/2014/main" id="{FCF291FA-FB18-4C59-847C-E0615635AF85}"/>
+                </a:ext>
+              </a:extLst>
+            </p:cNvPr>
+            <p:cNvSpPr/>
+            <p:nvPr/>
+          </p:nvSpPr>
+          <p:spPr>
+            <a:xfrm rot="5248940">
+              <a:off x="8394597" y="2310922"/>
+              <a:ext cx="311708" cy="865208"/>
+            </a:xfrm>
+            <a:prstGeom prst="downArrow">
+              <a:avLst/>
+            </a:prstGeom>
+            <a:solidFill>
+              <a:srgbClr val="FF0000"/>
+            </a:solidFill>
+            <a:ln>
+              <a:solidFill>
+                <a:srgbClr val="FF0000"/>
+              </a:solidFill>
+            </a:ln>
+          </p:spPr>
+          <p:style>
+            <a:lnRef idx="2">
+              <a:schemeClr val="accent1">
+                <a:shade val="50000"/>
+              </a:schemeClr>
+            </a:lnRef>
+            <a:fillRef idx="1">
+              <a:schemeClr val="accent1"/>
+            </a:fillRef>
+            <a:effectRef idx="0">
+              <a:schemeClr val="accent1"/>
+            </a:effectRef>
+            <a:fontRef idx="minor">
+              <a:schemeClr val="lt1"/>
+            </a:fontRef>
+          </p:style>
+          <p:txBody>
+            <a:bodyPr rtlCol="0" anchor="ctr"/>
+            <a:lstStyle/>
+            <a:p>
+              <a:pPr algn="ctr"/>
+              <a:endParaRPr lang="en-GB"/>
+            </a:p>
+          </p:txBody>
+        </p:sp>
+        <p:sp>
+          <p:nvSpPr>
+            <p:cNvPr id="27" name="Oval 26">
+              <a:extLst>
+                <a:ext uri="{FF2B5EF4-FFF2-40B4-BE49-F238E27FC236}">
+                  <a16:creationId xmlns:a16="http://schemas.microsoft.com/office/drawing/2014/main" id="{356A2246-870F-4CE0-A6C3-B76B8E62AE03}"/>
+                </a:ext>
+              </a:extLst>
+            </p:cNvPr>
+            <p:cNvSpPr/>
+            <p:nvPr/>
+          </p:nvSpPr>
+          <p:spPr>
+            <a:xfrm rot="60630">
+              <a:off x="8644195" y="2376888"/>
+              <a:ext cx="737993" cy="703336"/>
+            </a:xfrm>
+            <a:prstGeom prst="ellipse">
+              <a:avLst/>
+            </a:prstGeom>
+            <a:solidFill>
+              <a:schemeClr val="bg1"/>
+            </a:solidFill>
+            <a:ln w="28575">
+              <a:solidFill>
+                <a:srgbClr val="FF0000"/>
+              </a:solidFill>
+            </a:ln>
+          </p:spPr>
+          <p:style>
+            <a:lnRef idx="2">
+              <a:schemeClr val="accent1">
+                <a:shade val="50000"/>
+              </a:schemeClr>
+            </a:lnRef>
+            <a:fillRef idx="1">
+              <a:schemeClr val="accent1"/>
+            </a:fillRef>
+            <a:effectRef idx="0">
+              <a:schemeClr val="accent1"/>
+            </a:effectRef>
+            <a:fontRef idx="minor">
+              <a:schemeClr val="lt1"/>
+            </a:fontRef>
+          </p:style>
+          <p:txBody>
+            <a:bodyPr rtlCol="0" anchor="ctr"/>
+            <a:lstStyle/>
+            <a:p>
+              <a:pPr algn="ctr"/>
+              <a:endParaRPr lang="en-GB"/>
+            </a:p>
+          </p:txBody>
+        </p:sp>
+        <p:sp>
+          <p:nvSpPr>
+            <p:cNvPr id="28" name="TextBox 27">
+              <a:extLst>
+                <a:ext uri="{FF2B5EF4-FFF2-40B4-BE49-F238E27FC236}">
+                  <a16:creationId xmlns:a16="http://schemas.microsoft.com/office/drawing/2014/main" id="{6DAE4C67-EF0B-473E-A10E-630A5B1F9B1D}"/>
+                </a:ext>
+              </a:extLst>
+            </p:cNvPr>
+            <p:cNvSpPr txBox="1"/>
+            <p:nvPr/>
+          </p:nvSpPr>
+          <p:spPr>
+            <a:xfrm rot="60630">
+              <a:off x="8765922" y="2374786"/>
+              <a:ext cx="497252" cy="707886"/>
+            </a:xfrm>
+            <a:prstGeom prst="rect">
+              <a:avLst/>
+            </a:prstGeom>
+            <a:noFill/>
+          </p:spPr>
+          <p:txBody>
+            <a:bodyPr wrap="none" rtlCol="0">
+              <a:spAutoFit/>
+            </a:bodyPr>
+            <a:lstStyle/>
+            <a:p>
+              <a:r>
+                <a:rPr lang="en-US" sz="4000" dirty="0">
+                  <a:latin typeface="Arvo" panose="02000000000000000000" pitchFamily="2" charset="0"/>
+                </a:rPr>
+                <a:t>4</a:t>
+              </a:r>
+              <a:endParaRPr lang="en-GB" sz="4000" dirty="0">
+                <a:latin typeface="Arvo" panose="02000000000000000000" pitchFamily="2" charset="0"/>
+              </a:endParaRPr>
+            </a:p>
+          </p:txBody>
+        </p:sp>
+        <p:sp>
+          <p:nvSpPr>
+            <p:cNvPr id="29" name="Arrow: Down 28">
+              <a:extLst>
+                <a:ext uri="{FF2B5EF4-FFF2-40B4-BE49-F238E27FC236}">
+                  <a16:creationId xmlns:a16="http://schemas.microsoft.com/office/drawing/2014/main" id="{3A048CCF-8E30-4C9A-93A9-F5F269CF5EFC}"/>
+                </a:ext>
+              </a:extLst>
+            </p:cNvPr>
+            <p:cNvSpPr/>
+            <p:nvPr/>
+          </p:nvSpPr>
+          <p:spPr>
+            <a:xfrm rot="7953517">
+              <a:off x="7329879" y="3813364"/>
+              <a:ext cx="311708" cy="865208"/>
+            </a:xfrm>
+            <a:prstGeom prst="downArrow">
+              <a:avLst/>
+            </a:prstGeom>
+            <a:solidFill>
+              <a:srgbClr val="FF0000"/>
+            </a:solidFill>
+            <a:ln>
+              <a:solidFill>
+                <a:srgbClr val="FF0000"/>
+              </a:solidFill>
+            </a:ln>
+          </p:spPr>
+          <p:style>
+            <a:lnRef idx="2">
+              <a:schemeClr val="accent1">
+                <a:shade val="50000"/>
+              </a:schemeClr>
+            </a:lnRef>
+            <a:fillRef idx="1">
+              <a:schemeClr val="accent1"/>
+            </a:fillRef>
+            <a:effectRef idx="0">
+              <a:schemeClr val="accent1"/>
+            </a:effectRef>
+            <a:fontRef idx="minor">
+              <a:schemeClr val="lt1"/>
+            </a:fontRef>
+          </p:style>
+          <p:txBody>
+            <a:bodyPr rtlCol="0" anchor="ctr"/>
+            <a:lstStyle/>
+            <a:p>
+              <a:pPr algn="ctr"/>
+              <a:endParaRPr lang="en-GB"/>
+            </a:p>
+          </p:txBody>
+        </p:sp>
+        <p:sp>
+          <p:nvSpPr>
+            <p:cNvPr id="32" name="Arrow: Down 31">
+              <a:extLst>
+                <a:ext uri="{FF2B5EF4-FFF2-40B4-BE49-F238E27FC236}">
+                  <a16:creationId xmlns:a16="http://schemas.microsoft.com/office/drawing/2014/main" id="{C1D64EEA-A1A3-43DA-B3B0-F9630821A61D}"/>
+                </a:ext>
+              </a:extLst>
+            </p:cNvPr>
+            <p:cNvSpPr/>
+            <p:nvPr/>
+          </p:nvSpPr>
+          <p:spPr>
+            <a:xfrm rot="13230889">
+              <a:off x="8082671" y="3749311"/>
+              <a:ext cx="311708" cy="865208"/>
+            </a:xfrm>
+            <a:prstGeom prst="downArrow">
+              <a:avLst/>
+            </a:prstGeom>
+            <a:solidFill>
+              <a:srgbClr val="FF0000"/>
+            </a:solidFill>
+            <a:ln>
+              <a:solidFill>
+                <a:srgbClr val="FF0000"/>
+              </a:solidFill>
+            </a:ln>
+          </p:spPr>
+          <p:style>
+            <a:lnRef idx="2">
+              <a:schemeClr val="accent1">
+                <a:shade val="50000"/>
+              </a:schemeClr>
+            </a:lnRef>
+            <a:fillRef idx="1">
+              <a:schemeClr val="accent1"/>
+            </a:fillRef>
+            <a:effectRef idx="0">
+              <a:schemeClr val="accent1"/>
+            </a:effectRef>
+            <a:fontRef idx="minor">
+              <a:schemeClr val="lt1"/>
+            </a:fontRef>
+          </p:style>
+          <p:txBody>
+            <a:bodyPr rtlCol="0" anchor="ctr"/>
+            <a:lstStyle/>
+            <a:p>
+              <a:pPr algn="ctr"/>
+              <a:endParaRPr lang="en-GB"/>
+            </a:p>
+          </p:txBody>
+        </p:sp>
+        <p:sp>
+          <p:nvSpPr>
+            <p:cNvPr id="30" name="Oval 29">
+              <a:extLst>
+                <a:ext uri="{FF2B5EF4-FFF2-40B4-BE49-F238E27FC236}">
+                  <a16:creationId xmlns:a16="http://schemas.microsoft.com/office/drawing/2014/main" id="{978E4035-9BF9-4E24-A0FF-F7BBE08225DD}"/>
+                </a:ext>
+              </a:extLst>
+            </p:cNvPr>
+            <p:cNvSpPr/>
+            <p:nvPr/>
+          </p:nvSpPr>
+          <p:spPr>
+            <a:xfrm rot="60630">
+              <a:off x="7547689" y="4057735"/>
+              <a:ext cx="737993" cy="703336"/>
+            </a:xfrm>
+            <a:prstGeom prst="ellipse">
+              <a:avLst/>
+            </a:prstGeom>
+            <a:solidFill>
+              <a:schemeClr val="bg1"/>
+            </a:solidFill>
+            <a:ln w="28575">
+              <a:solidFill>
+                <a:srgbClr val="FF0000"/>
+              </a:solidFill>
+            </a:ln>
+          </p:spPr>
+          <p:style>
+            <a:lnRef idx="2">
+              <a:schemeClr val="accent1">
+                <a:shade val="50000"/>
+              </a:schemeClr>
+            </a:lnRef>
+            <a:fillRef idx="1">
+              <a:schemeClr val="accent1"/>
+            </a:fillRef>
+            <a:effectRef idx="0">
+              <a:schemeClr val="accent1"/>
+            </a:effectRef>
+            <a:fontRef idx="minor">
+              <a:schemeClr val="lt1"/>
+            </a:fontRef>
+          </p:style>
+          <p:txBody>
+            <a:bodyPr rtlCol="0" anchor="ctr"/>
+            <a:lstStyle/>
+            <a:p>
+              <a:pPr algn="ctr"/>
+              <a:endParaRPr lang="en-GB"/>
+            </a:p>
+          </p:txBody>
+        </p:sp>
+        <p:sp>
+          <p:nvSpPr>
+            <p:cNvPr id="31" name="TextBox 30">
+              <a:extLst>
+                <a:ext uri="{FF2B5EF4-FFF2-40B4-BE49-F238E27FC236}">
+                  <a16:creationId xmlns:a16="http://schemas.microsoft.com/office/drawing/2014/main" id="{55E50180-638E-4C23-B85D-528DB09E4757}"/>
+                </a:ext>
+              </a:extLst>
+            </p:cNvPr>
+            <p:cNvSpPr txBox="1"/>
+            <p:nvPr/>
+          </p:nvSpPr>
+          <p:spPr>
+            <a:xfrm rot="60630">
+              <a:off x="7687049" y="4055633"/>
+              <a:ext cx="461986" cy="707886"/>
+            </a:xfrm>
+            <a:prstGeom prst="rect">
+              <a:avLst/>
+            </a:prstGeom>
+            <a:noFill/>
+          </p:spPr>
+          <p:txBody>
+            <a:bodyPr wrap="none" rtlCol="0">
+              <a:spAutoFit/>
+            </a:bodyPr>
+            <a:lstStyle/>
+            <a:p>
+              <a:r>
+                <a:rPr lang="en-US" sz="4000" dirty="0">
+                  <a:latin typeface="Arvo" panose="02000000000000000000" pitchFamily="2" charset="0"/>
+                </a:rPr>
+                <a:t>3</a:t>
+              </a:r>
+              <a:endParaRPr lang="en-GB" sz="4000" dirty="0">
+                <a:latin typeface="Arvo" panose="02000000000000000000" pitchFamily="2" charset="0"/>
+              </a:endParaRPr>
+            </a:p>
+          </p:txBody>
+        </p:sp>
+        <p:sp>
+          <p:nvSpPr>
+            <p:cNvPr id="33" name="Arrow: Down 32">
+              <a:extLst>
+                <a:ext uri="{FF2B5EF4-FFF2-40B4-BE49-F238E27FC236}">
+                  <a16:creationId xmlns:a16="http://schemas.microsoft.com/office/drawing/2014/main" id="{7E86854C-DD9E-4758-A657-2E55595C0019}"/>
+                </a:ext>
+              </a:extLst>
+            </p:cNvPr>
+            <p:cNvSpPr/>
+            <p:nvPr/>
+          </p:nvSpPr>
+          <p:spPr>
+            <a:xfrm rot="5248940">
+              <a:off x="7321494" y="5169694"/>
+              <a:ext cx="311708" cy="865208"/>
+            </a:xfrm>
+            <a:prstGeom prst="downArrow">
+              <a:avLst/>
+            </a:prstGeom>
+            <a:solidFill>
+              <a:srgbClr val="FF0000"/>
+            </a:solidFill>
+            <a:ln>
+              <a:solidFill>
+                <a:srgbClr val="FF0000"/>
+              </a:solidFill>
+            </a:ln>
+          </p:spPr>
+          <p:style>
+            <a:lnRef idx="2">
+              <a:schemeClr val="accent1">
+                <a:shade val="50000"/>
+              </a:schemeClr>
+            </a:lnRef>
+            <a:fillRef idx="1">
+              <a:schemeClr val="accent1"/>
+            </a:fillRef>
+            <a:effectRef idx="0">
+              <a:schemeClr val="accent1"/>
+            </a:effectRef>
+            <a:fontRef idx="minor">
+              <a:schemeClr val="lt1"/>
+            </a:fontRef>
+          </p:style>
+          <p:txBody>
+            <a:bodyPr rtlCol="0" anchor="ctr"/>
+            <a:lstStyle/>
+            <a:p>
+              <a:pPr algn="ctr"/>
+              <a:endParaRPr lang="en-GB"/>
+            </a:p>
+          </p:txBody>
+        </p:sp>
+        <p:sp>
+          <p:nvSpPr>
+            <p:cNvPr id="34" name="Oval 33">
+              <a:extLst>
+                <a:ext uri="{FF2B5EF4-FFF2-40B4-BE49-F238E27FC236}">
+                  <a16:creationId xmlns:a16="http://schemas.microsoft.com/office/drawing/2014/main" id="{752A7DD8-B109-49F4-B95A-A110C6FF0119}"/>
+                </a:ext>
+              </a:extLst>
+            </p:cNvPr>
+            <p:cNvSpPr/>
+            <p:nvPr/>
+          </p:nvSpPr>
+          <p:spPr>
+            <a:xfrm rot="60630">
+              <a:off x="7571092" y="5235660"/>
+              <a:ext cx="737993" cy="703336"/>
+            </a:xfrm>
+            <a:prstGeom prst="ellipse">
+              <a:avLst/>
+            </a:prstGeom>
+            <a:solidFill>
+              <a:schemeClr val="bg1"/>
+            </a:solidFill>
+            <a:ln w="28575">
+              <a:solidFill>
+                <a:srgbClr val="FF0000"/>
+              </a:solidFill>
+            </a:ln>
+          </p:spPr>
+          <p:style>
+            <a:lnRef idx="2">
+              <a:schemeClr val="accent1">
+                <a:shade val="50000"/>
+              </a:schemeClr>
+            </a:lnRef>
+            <a:fillRef idx="1">
+              <a:schemeClr val="accent1"/>
+            </a:fillRef>
+            <a:effectRef idx="0">
+              <a:schemeClr val="accent1"/>
+            </a:effectRef>
+            <a:fontRef idx="minor">
+              <a:schemeClr val="lt1"/>
+            </a:fontRef>
+          </p:style>
+          <p:txBody>
+            <a:bodyPr rtlCol="0" anchor="ctr"/>
+            <a:lstStyle/>
+            <a:p>
+              <a:pPr algn="ctr"/>
+              <a:endParaRPr lang="en-GB"/>
+            </a:p>
+          </p:txBody>
+        </p:sp>
+        <p:sp>
+          <p:nvSpPr>
+            <p:cNvPr id="35" name="TextBox 34">
+              <a:extLst>
+                <a:ext uri="{FF2B5EF4-FFF2-40B4-BE49-F238E27FC236}">
+                  <a16:creationId xmlns:a16="http://schemas.microsoft.com/office/drawing/2014/main" id="{2A45745C-0E59-4953-A685-B8BDEA2FCECF}"/>
+                </a:ext>
+              </a:extLst>
+            </p:cNvPr>
+            <p:cNvSpPr txBox="1"/>
+            <p:nvPr/>
+          </p:nvSpPr>
+          <p:spPr>
+            <a:xfrm rot="60630">
+              <a:off x="7706445" y="5233558"/>
+              <a:ext cx="470000" cy="707886"/>
+            </a:xfrm>
+            <a:prstGeom prst="rect">
+              <a:avLst/>
+            </a:prstGeom>
+            <a:noFill/>
+          </p:spPr>
+          <p:txBody>
+            <a:bodyPr wrap="none" rtlCol="0">
+              <a:spAutoFit/>
+            </a:bodyPr>
+            <a:lstStyle/>
+            <a:p>
+              <a:r>
+                <a:rPr lang="en-US" sz="4000" dirty="0">
+                  <a:latin typeface="Arvo" panose="02000000000000000000" pitchFamily="2" charset="0"/>
+                </a:rPr>
+                <a:t>5</a:t>
+              </a:r>
+              <a:endParaRPr lang="en-GB" sz="4000" dirty="0">
+                <a:latin typeface="Arvo" panose="02000000000000000000" pitchFamily="2" charset="0"/>
+              </a:endParaRPr>
+            </a:p>
+          </p:txBody>
+        </p:sp>
+        <p:sp>
+          <p:nvSpPr>
+            <p:cNvPr id="36" name="TextBox 35">
+              <a:extLst>
+                <a:ext uri="{FF2B5EF4-FFF2-40B4-BE49-F238E27FC236}">
+                  <a16:creationId xmlns:a16="http://schemas.microsoft.com/office/drawing/2014/main" id="{B8009469-85AD-4927-AA3B-9B7D53D5941A}"/>
+                </a:ext>
+              </a:extLst>
+            </p:cNvPr>
+            <p:cNvSpPr txBox="1"/>
+            <p:nvPr/>
+          </p:nvSpPr>
+          <p:spPr>
+            <a:xfrm>
+              <a:off x="4141889" y="5062574"/>
+              <a:ext cx="1947333" cy="461665"/>
+            </a:xfrm>
+            <a:prstGeom prst="rect">
+              <a:avLst/>
+            </a:prstGeom>
+            <a:solidFill>
+              <a:schemeClr val="bg1"/>
+            </a:solidFill>
+            <a:effectLst>
+              <a:outerShdw blurRad="50800" dist="38100" dir="2700000" algn="tl" rotWithShape="0">
+                <a:prstClr val="black">
+                  <a:alpha val="40000"/>
+                </a:prstClr>
+              </a:outerShdw>
+            </a:effectLst>
+          </p:spPr>
+          <p:txBody>
+            <a:bodyPr wrap="square" rtlCol="0">
+              <a:spAutoFit/>
+            </a:bodyPr>
+            <a:lstStyle/>
+            <a:p>
+              <a:r>
+                <a:rPr lang="en-US" sz="1200" dirty="0">
+                  <a:latin typeface="Arvo" panose="02000000000000000000" pitchFamily="2" charset="0"/>
+                </a:rPr>
+                <a:t>Change the status of your experiment</a:t>
+              </a:r>
+              <a:endParaRPr lang="en-GB" sz="1200" dirty="0">
+                <a:latin typeface="Arvo" panose="02000000000000000000" pitchFamily="2" charset="0"/>
+              </a:endParaRPr>
+            </a:p>
+          </p:txBody>
+        </p:sp>
+        <p:sp>
+          <p:nvSpPr>
+            <p:cNvPr id="37" name="TextBox 36">
+              <a:extLst>
+                <a:ext uri="{FF2B5EF4-FFF2-40B4-BE49-F238E27FC236}">
+                  <a16:creationId xmlns:a16="http://schemas.microsoft.com/office/drawing/2014/main" id="{E29E9395-DAE7-4100-99C1-596A7F5C8306}"/>
+                </a:ext>
+              </a:extLst>
+            </p:cNvPr>
+            <p:cNvSpPr txBox="1"/>
+            <p:nvPr/>
+          </p:nvSpPr>
+          <p:spPr>
+            <a:xfrm>
+              <a:off x="4953424" y="2565503"/>
+              <a:ext cx="1057909" cy="646331"/>
+            </a:xfrm>
+            <a:prstGeom prst="rect">
+              <a:avLst/>
+            </a:prstGeom>
+            <a:solidFill>
+              <a:schemeClr val="bg1"/>
+            </a:solidFill>
+            <a:effectLst>
+              <a:outerShdw blurRad="50800" dist="38100" dir="2700000" algn="tl" rotWithShape="0">
+                <a:prstClr val="black">
+                  <a:alpha val="40000"/>
+                </a:prstClr>
+              </a:outerShdw>
+            </a:effectLst>
+          </p:spPr>
+          <p:txBody>
+            <a:bodyPr wrap="square" rtlCol="0">
+              <a:spAutoFit/>
+            </a:bodyPr>
+            <a:lstStyle/>
+            <a:p>
+              <a:r>
+                <a:rPr lang="en-US" sz="1200" dirty="0">
+                  <a:latin typeface="Arvo" panose="02000000000000000000" pitchFamily="2" charset="0"/>
+                </a:rPr>
+                <a:t>Pilot and run your study</a:t>
+              </a:r>
+              <a:endParaRPr lang="en-GB" sz="1200" dirty="0">
+                <a:latin typeface="Arvo" panose="02000000000000000000" pitchFamily="2" charset="0"/>
+              </a:endParaRPr>
+            </a:p>
+          </p:txBody>
+        </p:sp>
+        <p:sp>
+          <p:nvSpPr>
+            <p:cNvPr id="38" name="TextBox 37">
+              <a:extLst>
+                <a:ext uri="{FF2B5EF4-FFF2-40B4-BE49-F238E27FC236}">
+                  <a16:creationId xmlns:a16="http://schemas.microsoft.com/office/drawing/2014/main" id="{2BE10642-366F-424E-9CFF-8B20AD11F5BA}"/>
+                </a:ext>
+              </a:extLst>
+            </p:cNvPr>
+            <p:cNvSpPr txBox="1"/>
+            <p:nvPr/>
+          </p:nvSpPr>
+          <p:spPr>
+            <a:xfrm>
+              <a:off x="8117841" y="4352034"/>
+              <a:ext cx="1382626" cy="646331"/>
+            </a:xfrm>
+            <a:prstGeom prst="rect">
+              <a:avLst/>
+            </a:prstGeom>
+            <a:solidFill>
+              <a:schemeClr val="bg1"/>
+            </a:solidFill>
+            <a:effectLst>
+              <a:outerShdw blurRad="50800" dist="38100" dir="2700000" algn="tl" rotWithShape="0">
+                <a:prstClr val="black">
+                  <a:alpha val="40000"/>
+                </a:prstClr>
+              </a:outerShdw>
+            </a:effectLst>
+          </p:spPr>
+          <p:txBody>
+            <a:bodyPr wrap="square" rtlCol="0">
+              <a:spAutoFit/>
+            </a:bodyPr>
+            <a:lstStyle/>
+            <a:p>
+              <a:r>
+                <a:rPr lang="en-US" sz="1200" dirty="0">
+                  <a:latin typeface="Arvo" panose="02000000000000000000" pitchFamily="2" charset="0"/>
+                </a:rPr>
+                <a:t>Set your data to save how you need</a:t>
+              </a:r>
+              <a:endParaRPr lang="en-GB" sz="1200" dirty="0">
+                <a:latin typeface="Arvo" panose="02000000000000000000" pitchFamily="2" charset="0"/>
+              </a:endParaRPr>
+            </a:p>
+          </p:txBody>
+        </p:sp>
+        <p:sp>
+          <p:nvSpPr>
+            <p:cNvPr id="39" name="TextBox 38">
+              <a:extLst>
+                <a:ext uri="{FF2B5EF4-FFF2-40B4-BE49-F238E27FC236}">
+                  <a16:creationId xmlns:a16="http://schemas.microsoft.com/office/drawing/2014/main" id="{EDF91DC0-FC6D-4CAC-A683-B2D1526A8577}"/>
+                </a:ext>
+              </a:extLst>
+            </p:cNvPr>
+            <p:cNvSpPr txBox="1"/>
+            <p:nvPr/>
+          </p:nvSpPr>
+          <p:spPr>
+            <a:xfrm>
+              <a:off x="8349697" y="2961874"/>
+              <a:ext cx="1382626" cy="646331"/>
+            </a:xfrm>
+            <a:prstGeom prst="rect">
+              <a:avLst/>
+            </a:prstGeom>
+            <a:solidFill>
+              <a:schemeClr val="bg1"/>
+            </a:solidFill>
+            <a:effectLst>
+              <a:outerShdw blurRad="50800" dist="38100" dir="2700000" algn="tl" rotWithShape="0">
+                <a:prstClr val="black">
+                  <a:alpha val="40000"/>
+                </a:prstClr>
+              </a:outerShdw>
+            </a:effectLst>
+          </p:spPr>
+          <p:txBody>
+            <a:bodyPr wrap="square" rtlCol="0">
+              <a:spAutoFit/>
+            </a:bodyPr>
+            <a:lstStyle/>
+            <a:p>
+              <a:r>
+                <a:rPr lang="en-US" sz="1200" dirty="0">
+                  <a:latin typeface="Arvo" panose="02000000000000000000" pitchFamily="2" charset="0"/>
+                </a:rPr>
+                <a:t>Share your URL with participants</a:t>
+              </a:r>
+              <a:endParaRPr lang="en-GB" sz="1200" dirty="0">
+                <a:latin typeface="Arvo" panose="02000000000000000000" pitchFamily="2" charset="0"/>
+              </a:endParaRPr>
+            </a:p>
+          </p:txBody>
+        </p:sp>
+        <p:sp>
+          <p:nvSpPr>
+            <p:cNvPr id="40" name="TextBox 39">
+              <a:extLst>
+                <a:ext uri="{FF2B5EF4-FFF2-40B4-BE49-F238E27FC236}">
+                  <a16:creationId xmlns:a16="http://schemas.microsoft.com/office/drawing/2014/main" id="{B6E4E7FA-AA05-4C72-BD74-E3AAC0B1204F}"/>
+                </a:ext>
+              </a:extLst>
+            </p:cNvPr>
+            <p:cNvSpPr txBox="1"/>
+            <p:nvPr/>
+          </p:nvSpPr>
+          <p:spPr>
+            <a:xfrm>
+              <a:off x="8155242" y="5249223"/>
+              <a:ext cx="1382626" cy="461665"/>
+            </a:xfrm>
+            <a:prstGeom prst="rect">
+              <a:avLst/>
+            </a:prstGeom>
+            <a:solidFill>
+              <a:schemeClr val="bg1"/>
+            </a:solidFill>
+            <a:effectLst>
+              <a:outerShdw blurRad="50800" dist="38100" dir="2700000" algn="tl" rotWithShape="0">
+                <a:prstClr val="black">
+                  <a:alpha val="40000"/>
+                </a:prstClr>
+              </a:outerShdw>
+            </a:effectLst>
+          </p:spPr>
+          <p:txBody>
+            <a:bodyPr wrap="square" rtlCol="0">
+              <a:spAutoFit/>
+            </a:bodyPr>
+            <a:lstStyle/>
+            <a:p>
+              <a:r>
+                <a:rPr lang="en-US" sz="1200" dirty="0">
+                  <a:latin typeface="Arvo" panose="02000000000000000000" pitchFamily="2" charset="0"/>
+                </a:rPr>
+                <a:t>Download your data!</a:t>
+              </a:r>
+              <a:endParaRPr lang="en-GB" sz="1200" dirty="0">
+                <a:latin typeface="Arvo" panose="02000000000000000000" pitchFamily="2" charset="0"/>
+              </a:endParaRPr>
+            </a:p>
+          </p:txBody>
+        </p:sp>
+      </p:grpSp>
+    </p:spTree>
+    <p:extLst>
+      <p:ext uri="{BB962C8B-B14F-4D97-AF65-F5344CB8AC3E}">
+        <p14:creationId xmlns:p14="http://schemas.microsoft.com/office/powerpoint/2010/main" val="2100611557"/>
+      </p:ext>
+    </p:extLst>
+  </p:cSld>
+  <p:clrMapOvr>
+    <a:masterClrMapping/>
+  </p:clrMapOvr>
+</p:sld>
+</file>
+
+<file path=ppt/slides/slide8.xml><?xml version="1.0" encoding="utf-8"?>
+<p:sld xmlns:a="http://schemas.openxmlformats.org/drawingml/2006/main" xmlns:r="http://schemas.openxmlformats.org/officeDocument/2006/relationships" xmlns:p="http://schemas.openxmlformats.org/presentationml/2006/main">
+  <p:cSld>
+    <p:spTree>
+      <p:nvGrpSpPr>
+        <p:cNvPr id="1" name=""/>
+        <p:cNvGrpSpPr/>
+        <p:nvPr/>
+      </p:nvGrpSpPr>
+      <p:grpSpPr>
+        <a:xfrm>
+          <a:off x="0" y="0"/>
+          <a:ext cx="0" cy="0"/>
+          <a:chOff x="0" y="0"/>
+          <a:chExt cx="0" cy="0"/>
+        </a:xfrm>
+      </p:grpSpPr>
+      <p:grpSp>
+        <p:nvGrpSpPr>
+          <p:cNvPr id="4" name="Group 3">
+            <a:extLst>
+              <a:ext uri="{FF2B5EF4-FFF2-40B4-BE49-F238E27FC236}">
+                <a16:creationId xmlns:a16="http://schemas.microsoft.com/office/drawing/2014/main" id="{241FC057-B361-4919-8F83-F0401D16D571}"/>
+              </a:ext>
+            </a:extLst>
+          </p:cNvPr>
+          <p:cNvGrpSpPr/>
+          <p:nvPr/>
+        </p:nvGrpSpPr>
+        <p:grpSpPr>
+          <a:xfrm>
+            <a:off x="343934" y="241739"/>
+            <a:ext cx="11890928" cy="6453352"/>
+            <a:chOff x="343934" y="241739"/>
+            <a:chExt cx="11890928" cy="6453352"/>
+          </a:xfrm>
+        </p:grpSpPr>
+        <p:pic>
+          <p:nvPicPr>
+            <p:cNvPr id="3" name="Picture 2" descr="Graphical user interface, application&#10;&#10;Description automatically generated">
+              <a:extLst>
+                <a:ext uri="{FF2B5EF4-FFF2-40B4-BE49-F238E27FC236}">
+                  <a16:creationId xmlns:a16="http://schemas.microsoft.com/office/drawing/2014/main" id="{1D2EABA5-C3C7-4839-9E31-CFFA4C52EC7B}"/>
+                </a:ext>
+              </a:extLst>
+            </p:cNvPr>
+            <p:cNvPicPr>
+              <a:picLocks noChangeAspect="1"/>
+            </p:cNvPicPr>
+            <p:nvPr/>
+          </p:nvPicPr>
+          <p:blipFill rotWithShape="1">
+            <a:blip r:embed="rId2">
+              <a:extLst>
+                <a:ext uri="{28A0092B-C50C-407E-A947-70E740481C1C}">
+                  <a14:useLocalDpi xmlns:a14="http://schemas.microsoft.com/office/drawing/2010/main" val="0"/>
+                </a:ext>
+              </a:extLst>
+            </a:blip>
+            <a:srcRect t="3525" b="2376"/>
+            <a:stretch/>
+          </p:blipFill>
+          <p:spPr>
+            <a:xfrm>
+              <a:off x="343934" y="241739"/>
+              <a:ext cx="11504131" cy="6453352"/>
+            </a:xfrm>
+            <a:prstGeom prst="rect">
+              <a:avLst/>
+            </a:prstGeom>
+          </p:spPr>
+        </p:pic>
+        <p:sp>
+          <p:nvSpPr>
+            <p:cNvPr id="42" name="Arrow: Down 41">
+              <a:extLst>
+                <a:ext uri="{FF2B5EF4-FFF2-40B4-BE49-F238E27FC236}">
+                  <a16:creationId xmlns:a16="http://schemas.microsoft.com/office/drawing/2014/main" id="{2FF10326-0629-45B6-8E0F-EF274B906B7D}"/>
+                </a:ext>
+              </a:extLst>
+            </p:cNvPr>
+            <p:cNvSpPr/>
+            <p:nvPr/>
+          </p:nvSpPr>
+          <p:spPr>
+            <a:xfrm rot="10800000">
+              <a:off x="2871758" y="836592"/>
+              <a:ext cx="311708" cy="865208"/>
+            </a:xfrm>
+            <a:prstGeom prst="downArrow">
+              <a:avLst/>
+            </a:prstGeom>
+            <a:solidFill>
+              <a:srgbClr val="FF0000"/>
+            </a:solidFill>
+            <a:ln>
+              <a:solidFill>
+                <a:srgbClr val="FF0000"/>
+              </a:solidFill>
+            </a:ln>
+          </p:spPr>
+          <p:style>
+            <a:lnRef idx="2">
+              <a:schemeClr val="accent1">
+                <a:shade val="50000"/>
+              </a:schemeClr>
+            </a:lnRef>
+            <a:fillRef idx="1">
+              <a:schemeClr val="accent1"/>
+            </a:fillRef>
+            <a:effectRef idx="0">
+              <a:schemeClr val="accent1"/>
+            </a:effectRef>
+            <a:fontRef idx="minor">
+              <a:schemeClr val="lt1"/>
+            </a:fontRef>
+          </p:style>
+          <p:txBody>
+            <a:bodyPr rtlCol="0" anchor="ctr"/>
+            <a:lstStyle/>
+            <a:p>
+              <a:pPr algn="ctr"/>
+              <a:endParaRPr lang="en-GB"/>
+            </a:p>
+          </p:txBody>
+        </p:sp>
+        <p:sp>
+          <p:nvSpPr>
+            <p:cNvPr id="43" name="Oval 42">
+              <a:extLst>
+                <a:ext uri="{FF2B5EF4-FFF2-40B4-BE49-F238E27FC236}">
+                  <a16:creationId xmlns:a16="http://schemas.microsoft.com/office/drawing/2014/main" id="{207A9006-53A1-4B20-AD50-660A2E898132}"/>
+                </a:ext>
+              </a:extLst>
+            </p:cNvPr>
+            <p:cNvSpPr/>
+            <p:nvPr/>
+          </p:nvSpPr>
+          <p:spPr>
+            <a:xfrm rot="60630">
+              <a:off x="2675192" y="1283562"/>
+              <a:ext cx="737993" cy="703336"/>
+            </a:xfrm>
+            <a:prstGeom prst="ellipse">
+              <a:avLst/>
+            </a:prstGeom>
+            <a:solidFill>
+              <a:schemeClr val="bg1"/>
+            </a:solidFill>
+            <a:ln w="28575">
+              <a:solidFill>
+                <a:srgbClr val="FF0000"/>
+              </a:solidFill>
+            </a:ln>
+          </p:spPr>
+          <p:style>
+            <a:lnRef idx="2">
+              <a:schemeClr val="accent1">
+                <a:shade val="50000"/>
+              </a:schemeClr>
+            </a:lnRef>
+            <a:fillRef idx="1">
+              <a:schemeClr val="accent1"/>
+            </a:fillRef>
+            <a:effectRef idx="0">
+              <a:schemeClr val="accent1"/>
+            </a:effectRef>
+            <a:fontRef idx="minor">
+              <a:schemeClr val="lt1"/>
+            </a:fontRef>
+          </p:style>
+          <p:txBody>
+            <a:bodyPr rtlCol="0" anchor="ctr"/>
+            <a:lstStyle/>
+            <a:p>
+              <a:pPr algn="ctr"/>
+              <a:endParaRPr lang="en-GB"/>
+            </a:p>
+          </p:txBody>
+        </p:sp>
+        <p:sp>
+          <p:nvSpPr>
+            <p:cNvPr id="44" name="TextBox 43">
+              <a:extLst>
+                <a:ext uri="{FF2B5EF4-FFF2-40B4-BE49-F238E27FC236}">
+                  <a16:creationId xmlns:a16="http://schemas.microsoft.com/office/drawing/2014/main" id="{8422970A-8D2D-46AB-80E7-2AC31CB0022E}"/>
+                </a:ext>
+              </a:extLst>
+            </p:cNvPr>
+            <p:cNvSpPr txBox="1"/>
+            <p:nvPr/>
+          </p:nvSpPr>
+          <p:spPr>
+            <a:xfrm rot="60630">
+              <a:off x="2845811" y="1281460"/>
+              <a:ext cx="399468" cy="707886"/>
+            </a:xfrm>
+            <a:prstGeom prst="rect">
+              <a:avLst/>
+            </a:prstGeom>
+            <a:noFill/>
+          </p:spPr>
+          <p:txBody>
+            <a:bodyPr wrap="none" rtlCol="0">
+              <a:spAutoFit/>
+            </a:bodyPr>
+            <a:lstStyle/>
+            <a:p>
+              <a:r>
+                <a:rPr lang="en-US" sz="4000" dirty="0">
+                  <a:latin typeface="Arvo" panose="02000000000000000000" pitchFamily="2" charset="0"/>
+                </a:rPr>
+                <a:t>1</a:t>
+              </a:r>
+              <a:endParaRPr lang="en-GB" sz="4000" dirty="0">
+                <a:latin typeface="Arvo" panose="02000000000000000000" pitchFamily="2" charset="0"/>
+              </a:endParaRPr>
+            </a:p>
+          </p:txBody>
+        </p:sp>
+        <p:sp>
+          <p:nvSpPr>
+            <p:cNvPr id="46" name="Arrow: Down 45">
+              <a:extLst>
+                <a:ext uri="{FF2B5EF4-FFF2-40B4-BE49-F238E27FC236}">
+                  <a16:creationId xmlns:a16="http://schemas.microsoft.com/office/drawing/2014/main" id="{32DA8588-B1F5-4E49-A9F2-0008FBFC6F7D}"/>
+                </a:ext>
+              </a:extLst>
+            </p:cNvPr>
+            <p:cNvSpPr/>
+            <p:nvPr/>
+          </p:nvSpPr>
+          <p:spPr>
+            <a:xfrm rot="5248940">
+              <a:off x="5871530" y="1767926"/>
+              <a:ext cx="311708" cy="865208"/>
+            </a:xfrm>
+            <a:prstGeom prst="downArrow">
+              <a:avLst/>
+            </a:prstGeom>
+            <a:solidFill>
+              <a:srgbClr val="FF0000"/>
+            </a:solidFill>
+            <a:ln>
+              <a:solidFill>
+                <a:srgbClr val="FF0000"/>
+              </a:solidFill>
+            </a:ln>
+          </p:spPr>
+          <p:style>
+            <a:lnRef idx="2">
+              <a:schemeClr val="accent1">
+                <a:shade val="50000"/>
+              </a:schemeClr>
+            </a:lnRef>
+            <a:fillRef idx="1">
+              <a:schemeClr val="accent1"/>
+            </a:fillRef>
+            <a:effectRef idx="0">
+              <a:schemeClr val="accent1"/>
+            </a:effectRef>
+            <a:fontRef idx="minor">
+              <a:schemeClr val="lt1"/>
+            </a:fontRef>
+          </p:style>
+          <p:txBody>
+            <a:bodyPr rtlCol="0" anchor="ctr"/>
+            <a:lstStyle/>
+            <a:p>
+              <a:pPr algn="ctr"/>
+              <a:endParaRPr lang="en-GB"/>
+            </a:p>
+          </p:txBody>
+        </p:sp>
+        <p:sp>
+          <p:nvSpPr>
+            <p:cNvPr id="47" name="Oval 46">
+              <a:extLst>
+                <a:ext uri="{FF2B5EF4-FFF2-40B4-BE49-F238E27FC236}">
+                  <a16:creationId xmlns:a16="http://schemas.microsoft.com/office/drawing/2014/main" id="{72C98FBA-17C4-4D96-AFAD-9E8A385F2C2B}"/>
+                </a:ext>
+              </a:extLst>
+            </p:cNvPr>
+            <p:cNvSpPr/>
+            <p:nvPr/>
+          </p:nvSpPr>
+          <p:spPr>
+            <a:xfrm rot="60630">
+              <a:off x="6121128" y="1554496"/>
+              <a:ext cx="737993" cy="703336"/>
+            </a:xfrm>
+            <a:prstGeom prst="ellipse">
+              <a:avLst/>
+            </a:prstGeom>
+            <a:solidFill>
+              <a:schemeClr val="bg1"/>
+            </a:solidFill>
+            <a:ln w="28575">
+              <a:solidFill>
+                <a:srgbClr val="FF0000"/>
+              </a:solidFill>
+            </a:ln>
+          </p:spPr>
+          <p:style>
+            <a:lnRef idx="2">
+              <a:schemeClr val="accent1">
+                <a:shade val="50000"/>
+              </a:schemeClr>
+            </a:lnRef>
+            <a:fillRef idx="1">
+              <a:schemeClr val="accent1"/>
+            </a:fillRef>
+            <a:effectRef idx="0">
+              <a:schemeClr val="accent1"/>
+            </a:effectRef>
+            <a:fontRef idx="minor">
+              <a:schemeClr val="lt1"/>
+            </a:fontRef>
+          </p:style>
+          <p:txBody>
+            <a:bodyPr rtlCol="0" anchor="ctr"/>
+            <a:lstStyle/>
+            <a:p>
+              <a:pPr algn="ctr"/>
+              <a:endParaRPr lang="en-GB"/>
+            </a:p>
+          </p:txBody>
+        </p:sp>
+        <p:sp>
+          <p:nvSpPr>
+            <p:cNvPr id="48" name="TextBox 47">
+              <a:extLst>
+                <a:ext uri="{FF2B5EF4-FFF2-40B4-BE49-F238E27FC236}">
+                  <a16:creationId xmlns:a16="http://schemas.microsoft.com/office/drawing/2014/main" id="{35E32C28-110E-4E65-86A4-BDE60271AAE3}"/>
+                </a:ext>
+              </a:extLst>
+            </p:cNvPr>
+            <p:cNvSpPr txBox="1"/>
+            <p:nvPr/>
+          </p:nvSpPr>
+          <p:spPr>
+            <a:xfrm rot="60630">
+              <a:off x="6261290" y="1552394"/>
+              <a:ext cx="460382" cy="707886"/>
+            </a:xfrm>
+            <a:prstGeom prst="rect">
+              <a:avLst/>
+            </a:prstGeom>
+            <a:noFill/>
+          </p:spPr>
+          <p:txBody>
+            <a:bodyPr wrap="none" rtlCol="0">
+              <a:spAutoFit/>
+            </a:bodyPr>
+            <a:lstStyle/>
+            <a:p>
+              <a:r>
+                <a:rPr lang="en-US" sz="4000" dirty="0">
+                  <a:latin typeface="Arvo" panose="02000000000000000000" pitchFamily="2" charset="0"/>
+                </a:rPr>
+                <a:t>2</a:t>
+              </a:r>
+              <a:endParaRPr lang="en-GB" sz="4000" dirty="0">
+                <a:latin typeface="Arvo" panose="02000000000000000000" pitchFamily="2" charset="0"/>
+              </a:endParaRPr>
+            </a:p>
+          </p:txBody>
+        </p:sp>
+        <p:sp>
+          <p:nvSpPr>
+            <p:cNvPr id="49" name="TextBox 48">
+              <a:extLst>
+                <a:ext uri="{FF2B5EF4-FFF2-40B4-BE49-F238E27FC236}">
+                  <a16:creationId xmlns:a16="http://schemas.microsoft.com/office/drawing/2014/main" id="{BDDAD86B-5619-48C4-ADF9-F03992ECC73C}"/>
+                </a:ext>
+              </a:extLst>
+            </p:cNvPr>
+            <p:cNvSpPr txBox="1"/>
+            <p:nvPr/>
+          </p:nvSpPr>
+          <p:spPr>
+            <a:xfrm>
+              <a:off x="6706025" y="1422507"/>
+              <a:ext cx="3352376" cy="646331"/>
+            </a:xfrm>
+            <a:prstGeom prst="rect">
+              <a:avLst/>
+            </a:prstGeom>
+            <a:solidFill>
+              <a:schemeClr val="bg1"/>
+            </a:solidFill>
+            <a:effectLst>
+              <a:outerShdw blurRad="50800" dist="38100" dir="2700000" algn="tl" rotWithShape="0">
+                <a:prstClr val="black">
+                  <a:alpha val="40000"/>
+                </a:prstClr>
+              </a:outerShdw>
+            </a:effectLst>
+          </p:spPr>
+          <p:txBody>
+            <a:bodyPr wrap="square" rtlCol="0">
+              <a:spAutoFit/>
+            </a:bodyPr>
+            <a:lstStyle/>
+            <a:p>
+              <a:r>
+                <a:rPr lang="en-US" sz="1200" dirty="0">
+                  <a:latin typeface="Arvo" panose="02000000000000000000" pitchFamily="2" charset="0"/>
+                </a:rPr>
+                <a:t>Do you want your compiled </a:t>
+              </a:r>
+              <a:r>
+                <a:rPr lang="en-US" sz="1200" dirty="0" err="1">
+                  <a:latin typeface="Arvo" panose="02000000000000000000" pitchFamily="2" charset="0"/>
+                </a:rPr>
+                <a:t>javascript</a:t>
+              </a:r>
+              <a:r>
+                <a:rPr lang="en-US" sz="1200" dirty="0">
+                  <a:latin typeface="Arvo" panose="02000000000000000000" pitchFamily="2" charset="0"/>
+                </a:rPr>
+                <a:t> to be send to a different folder? [recommend leaving blank]</a:t>
+              </a:r>
+              <a:endParaRPr lang="en-GB" sz="1200" dirty="0">
+                <a:latin typeface="Arvo" panose="02000000000000000000" pitchFamily="2" charset="0"/>
+              </a:endParaRPr>
+            </a:p>
+          </p:txBody>
+        </p:sp>
+        <p:sp>
+          <p:nvSpPr>
+            <p:cNvPr id="50" name="Arrow: Down 49">
+              <a:extLst>
+                <a:ext uri="{FF2B5EF4-FFF2-40B4-BE49-F238E27FC236}">
+                  <a16:creationId xmlns:a16="http://schemas.microsoft.com/office/drawing/2014/main" id="{0E171C03-7F01-4D80-ADAA-8EF14DC3809F}"/>
+                </a:ext>
+              </a:extLst>
+            </p:cNvPr>
+            <p:cNvSpPr/>
+            <p:nvPr/>
+          </p:nvSpPr>
+          <p:spPr>
+            <a:xfrm rot="5248940">
+              <a:off x="8098792" y="2134861"/>
+              <a:ext cx="311708" cy="865208"/>
+            </a:xfrm>
+            <a:prstGeom prst="downArrow">
+              <a:avLst/>
+            </a:prstGeom>
+            <a:solidFill>
+              <a:srgbClr val="FF0000"/>
+            </a:solidFill>
+            <a:ln>
+              <a:solidFill>
+                <a:srgbClr val="FF0000"/>
+              </a:solidFill>
+            </a:ln>
+          </p:spPr>
+          <p:style>
+            <a:lnRef idx="2">
+              <a:schemeClr val="accent1">
+                <a:shade val="50000"/>
+              </a:schemeClr>
+            </a:lnRef>
+            <a:fillRef idx="1">
+              <a:schemeClr val="accent1"/>
+            </a:fillRef>
+            <a:effectRef idx="0">
+              <a:schemeClr val="accent1"/>
+            </a:effectRef>
+            <a:fontRef idx="minor">
+              <a:schemeClr val="lt1"/>
+            </a:fontRef>
+          </p:style>
+          <p:txBody>
+            <a:bodyPr rtlCol="0" anchor="ctr"/>
+            <a:lstStyle/>
+            <a:p>
+              <a:pPr algn="ctr"/>
+              <a:endParaRPr lang="en-GB"/>
+            </a:p>
+          </p:txBody>
+        </p:sp>
+        <p:sp>
+          <p:nvSpPr>
+            <p:cNvPr id="51" name="Oval 50">
+              <a:extLst>
+                <a:ext uri="{FF2B5EF4-FFF2-40B4-BE49-F238E27FC236}">
+                  <a16:creationId xmlns:a16="http://schemas.microsoft.com/office/drawing/2014/main" id="{F584510C-C25A-43A7-8970-EBFE58BC76E8}"/>
+                </a:ext>
+              </a:extLst>
+            </p:cNvPr>
+            <p:cNvSpPr/>
+            <p:nvPr/>
+          </p:nvSpPr>
+          <p:spPr>
+            <a:xfrm rot="60630">
+              <a:off x="8348390" y="2200827"/>
+              <a:ext cx="737993" cy="703336"/>
+            </a:xfrm>
+            <a:prstGeom prst="ellipse">
+              <a:avLst/>
+            </a:prstGeom>
+            <a:solidFill>
+              <a:schemeClr val="bg1"/>
+            </a:solidFill>
+            <a:ln w="28575">
+              <a:solidFill>
+                <a:srgbClr val="FF0000"/>
+              </a:solidFill>
+            </a:ln>
+          </p:spPr>
+          <p:style>
+            <a:lnRef idx="2">
+              <a:schemeClr val="accent1">
+                <a:shade val="50000"/>
+              </a:schemeClr>
+            </a:lnRef>
+            <a:fillRef idx="1">
+              <a:schemeClr val="accent1"/>
+            </a:fillRef>
+            <a:effectRef idx="0">
+              <a:schemeClr val="accent1"/>
+            </a:effectRef>
+            <a:fontRef idx="minor">
+              <a:schemeClr val="lt1"/>
+            </a:fontRef>
+          </p:style>
+          <p:txBody>
+            <a:bodyPr rtlCol="0" anchor="ctr"/>
+            <a:lstStyle/>
+            <a:p>
+              <a:pPr algn="ctr"/>
+              <a:endParaRPr lang="en-GB"/>
+            </a:p>
+          </p:txBody>
+        </p:sp>
+        <p:sp>
+          <p:nvSpPr>
+            <p:cNvPr id="52" name="TextBox 51">
+              <a:extLst>
+                <a:ext uri="{FF2B5EF4-FFF2-40B4-BE49-F238E27FC236}">
+                  <a16:creationId xmlns:a16="http://schemas.microsoft.com/office/drawing/2014/main" id="{5472F67A-B5C2-40BC-BC50-94899DF35188}"/>
+                </a:ext>
+              </a:extLst>
+            </p:cNvPr>
+            <p:cNvSpPr txBox="1"/>
+            <p:nvPr/>
+          </p:nvSpPr>
+          <p:spPr>
+            <a:xfrm rot="60630">
+              <a:off x="8487750" y="2198725"/>
+              <a:ext cx="461986" cy="707886"/>
+            </a:xfrm>
+            <a:prstGeom prst="rect">
+              <a:avLst/>
+            </a:prstGeom>
+            <a:noFill/>
+          </p:spPr>
+          <p:txBody>
+            <a:bodyPr wrap="none" rtlCol="0">
+              <a:spAutoFit/>
+            </a:bodyPr>
+            <a:lstStyle/>
+            <a:p>
+              <a:r>
+                <a:rPr lang="en-US" sz="4000" dirty="0">
+                  <a:latin typeface="Arvo" panose="02000000000000000000" pitchFamily="2" charset="0"/>
+                </a:rPr>
+                <a:t>3</a:t>
+              </a:r>
+              <a:endParaRPr lang="en-GB" sz="4000" dirty="0">
+                <a:latin typeface="Arvo" panose="02000000000000000000" pitchFamily="2" charset="0"/>
+              </a:endParaRPr>
+            </a:p>
+          </p:txBody>
+        </p:sp>
+        <p:sp>
+          <p:nvSpPr>
+            <p:cNvPr id="53" name="TextBox 52">
+              <a:extLst>
+                <a:ext uri="{FF2B5EF4-FFF2-40B4-BE49-F238E27FC236}">
+                  <a16:creationId xmlns:a16="http://schemas.microsoft.com/office/drawing/2014/main" id="{46308309-4FFD-4CBB-AE32-B13C1DE01752}"/>
+                </a:ext>
+              </a:extLst>
+            </p:cNvPr>
+            <p:cNvSpPr txBox="1"/>
+            <p:nvPr/>
+          </p:nvSpPr>
+          <p:spPr>
+            <a:xfrm>
+              <a:off x="8882486" y="2314372"/>
+              <a:ext cx="3352376" cy="461665"/>
+            </a:xfrm>
+            <a:prstGeom prst="rect">
+              <a:avLst/>
+            </a:prstGeom>
+            <a:solidFill>
+              <a:schemeClr val="bg1"/>
+            </a:solidFill>
+            <a:effectLst>
+              <a:outerShdw blurRad="50800" dist="38100" dir="2700000" algn="tl" rotWithShape="0">
+                <a:prstClr val="black">
+                  <a:alpha val="40000"/>
+                </a:prstClr>
+              </a:outerShdw>
+            </a:effectLst>
+          </p:spPr>
+          <p:txBody>
+            <a:bodyPr wrap="square" rtlCol="0">
+              <a:spAutoFit/>
+            </a:bodyPr>
+            <a:lstStyle/>
+            <a:p>
+              <a:r>
+                <a:rPr lang="en-US" sz="1200" dirty="0">
+                  <a:latin typeface="Arvo" panose="02000000000000000000" pitchFamily="2" charset="0"/>
+                </a:rPr>
+                <a:t>When do you want the </a:t>
+              </a:r>
+              <a:r>
+                <a:rPr lang="en-US" sz="1200" dirty="0" err="1">
+                  <a:latin typeface="Arvo" panose="02000000000000000000" pitchFamily="2" charset="0"/>
+                </a:rPr>
+                <a:t>javascript</a:t>
+              </a:r>
+              <a:r>
+                <a:rPr lang="en-US" sz="1200" dirty="0">
+                  <a:latin typeface="Arvo" panose="02000000000000000000" pitchFamily="2" charset="0"/>
+                </a:rPr>
+                <a:t> file to be written? (and re-written)</a:t>
+              </a:r>
+              <a:endParaRPr lang="en-GB" sz="1200" dirty="0">
+                <a:latin typeface="Arvo" panose="02000000000000000000" pitchFamily="2" charset="0"/>
+              </a:endParaRPr>
+            </a:p>
+          </p:txBody>
+        </p:sp>
+        <p:sp>
+          <p:nvSpPr>
+            <p:cNvPr id="58" name="Arrow: Down 57">
+              <a:extLst>
+                <a:ext uri="{FF2B5EF4-FFF2-40B4-BE49-F238E27FC236}">
+                  <a16:creationId xmlns:a16="http://schemas.microsoft.com/office/drawing/2014/main" id="{DEEE11BF-BBE7-4756-9F9F-26B9C1B938BF}"/>
+                </a:ext>
+              </a:extLst>
+            </p:cNvPr>
+            <p:cNvSpPr/>
+            <p:nvPr/>
+          </p:nvSpPr>
+          <p:spPr>
+            <a:xfrm rot="6644394">
+              <a:off x="7719116" y="2681181"/>
+              <a:ext cx="311708" cy="865208"/>
+            </a:xfrm>
+            <a:prstGeom prst="downArrow">
+              <a:avLst/>
+            </a:prstGeom>
+            <a:solidFill>
+              <a:srgbClr val="FF0000"/>
+            </a:solidFill>
+            <a:ln>
+              <a:solidFill>
+                <a:srgbClr val="FF0000"/>
+              </a:solidFill>
+            </a:ln>
+          </p:spPr>
+          <p:style>
+            <a:lnRef idx="2">
+              <a:schemeClr val="accent1">
+                <a:shade val="50000"/>
+              </a:schemeClr>
+            </a:lnRef>
+            <a:fillRef idx="1">
+              <a:schemeClr val="accent1"/>
+            </a:fillRef>
+            <a:effectRef idx="0">
+              <a:schemeClr val="accent1"/>
+            </a:effectRef>
+            <a:fontRef idx="minor">
+              <a:schemeClr val="lt1"/>
+            </a:fontRef>
+          </p:style>
+          <p:txBody>
+            <a:bodyPr rtlCol="0" anchor="ctr"/>
+            <a:lstStyle/>
+            <a:p>
+              <a:pPr algn="ctr"/>
+              <a:endParaRPr lang="en-GB"/>
+            </a:p>
+          </p:txBody>
+        </p:sp>
+        <p:sp>
+          <p:nvSpPr>
+            <p:cNvPr id="62" name="Arrow: Down 61">
+              <a:extLst>
+                <a:ext uri="{FF2B5EF4-FFF2-40B4-BE49-F238E27FC236}">
+                  <a16:creationId xmlns:a16="http://schemas.microsoft.com/office/drawing/2014/main" id="{9C0D8086-C53C-4282-99B5-A7C6A1F06890}"/>
+                </a:ext>
+              </a:extLst>
+            </p:cNvPr>
+            <p:cNvSpPr/>
+            <p:nvPr/>
+          </p:nvSpPr>
+          <p:spPr>
+            <a:xfrm rot="6603235">
+              <a:off x="7659757" y="3012661"/>
+              <a:ext cx="311708" cy="865208"/>
+            </a:xfrm>
+            <a:prstGeom prst="downArrow">
+              <a:avLst/>
+            </a:prstGeom>
+            <a:solidFill>
+              <a:srgbClr val="FF0000"/>
+            </a:solidFill>
+            <a:ln>
+              <a:solidFill>
+                <a:srgbClr val="FF0000"/>
+              </a:solidFill>
+            </a:ln>
+          </p:spPr>
+          <p:style>
+            <a:lnRef idx="2">
+              <a:schemeClr val="accent1">
+                <a:shade val="50000"/>
+              </a:schemeClr>
+            </a:lnRef>
+            <a:fillRef idx="1">
+              <a:schemeClr val="accent1"/>
+            </a:fillRef>
+            <a:effectRef idx="0">
+              <a:schemeClr val="accent1"/>
+            </a:effectRef>
+            <a:fontRef idx="minor">
+              <a:schemeClr val="lt1"/>
+            </a:fontRef>
+          </p:style>
+          <p:txBody>
+            <a:bodyPr rtlCol="0" anchor="ctr"/>
+            <a:lstStyle/>
+            <a:p>
+              <a:pPr algn="ctr"/>
+              <a:endParaRPr lang="en-GB"/>
+            </a:p>
+          </p:txBody>
+        </p:sp>
+        <p:sp>
+          <p:nvSpPr>
+            <p:cNvPr id="59" name="Oval 58">
+              <a:extLst>
+                <a:ext uri="{FF2B5EF4-FFF2-40B4-BE49-F238E27FC236}">
+                  <a16:creationId xmlns:a16="http://schemas.microsoft.com/office/drawing/2014/main" id="{82309AD8-87FF-4A95-A1F8-FE0DDE753ADF}"/>
+                </a:ext>
+              </a:extLst>
+            </p:cNvPr>
+            <p:cNvSpPr/>
+            <p:nvPr/>
+          </p:nvSpPr>
+          <p:spPr>
+            <a:xfrm rot="60630">
+              <a:off x="7808149" y="3001736"/>
+              <a:ext cx="737993" cy="703336"/>
+            </a:xfrm>
+            <a:prstGeom prst="ellipse">
+              <a:avLst/>
+            </a:prstGeom>
+            <a:solidFill>
+              <a:schemeClr val="bg1"/>
+            </a:solidFill>
+            <a:ln w="28575">
+              <a:solidFill>
+                <a:srgbClr val="FF0000"/>
+              </a:solidFill>
+            </a:ln>
+          </p:spPr>
+          <p:style>
+            <a:lnRef idx="2">
+              <a:schemeClr val="accent1">
+                <a:shade val="50000"/>
+              </a:schemeClr>
+            </a:lnRef>
+            <a:fillRef idx="1">
+              <a:schemeClr val="accent1"/>
+            </a:fillRef>
+            <a:effectRef idx="0">
+              <a:schemeClr val="accent1"/>
+            </a:effectRef>
+            <a:fontRef idx="minor">
+              <a:schemeClr val="lt1"/>
+            </a:fontRef>
+          </p:style>
+          <p:txBody>
+            <a:bodyPr rtlCol="0" anchor="ctr"/>
+            <a:lstStyle/>
+            <a:p>
+              <a:pPr algn="ctr"/>
+              <a:endParaRPr lang="en-GB"/>
+            </a:p>
+          </p:txBody>
+        </p:sp>
+        <p:sp>
+          <p:nvSpPr>
+            <p:cNvPr id="60" name="TextBox 59">
+              <a:extLst>
+                <a:ext uri="{FF2B5EF4-FFF2-40B4-BE49-F238E27FC236}">
+                  <a16:creationId xmlns:a16="http://schemas.microsoft.com/office/drawing/2014/main" id="{A3A2B818-E6EA-476A-844A-A476FAC91525}"/>
+                </a:ext>
+              </a:extLst>
+            </p:cNvPr>
+            <p:cNvSpPr txBox="1"/>
+            <p:nvPr/>
+          </p:nvSpPr>
+          <p:spPr>
+            <a:xfrm rot="60630">
+              <a:off x="7929876" y="2999634"/>
+              <a:ext cx="497252" cy="707886"/>
+            </a:xfrm>
+            <a:prstGeom prst="rect">
+              <a:avLst/>
+            </a:prstGeom>
+            <a:noFill/>
+          </p:spPr>
+          <p:txBody>
+            <a:bodyPr wrap="none" rtlCol="0">
+              <a:spAutoFit/>
+            </a:bodyPr>
+            <a:lstStyle/>
+            <a:p>
+              <a:r>
+                <a:rPr lang="en-US" sz="4000" dirty="0">
+                  <a:latin typeface="Arvo" panose="02000000000000000000" pitchFamily="2" charset="0"/>
+                </a:rPr>
+                <a:t>4</a:t>
+              </a:r>
+              <a:endParaRPr lang="en-GB" sz="4000" dirty="0">
+                <a:latin typeface="Arvo" panose="02000000000000000000" pitchFamily="2" charset="0"/>
+              </a:endParaRPr>
+            </a:p>
+          </p:txBody>
+        </p:sp>
+        <p:sp>
+          <p:nvSpPr>
+            <p:cNvPr id="61" name="TextBox 60">
+              <a:extLst>
+                <a:ext uri="{FF2B5EF4-FFF2-40B4-BE49-F238E27FC236}">
+                  <a16:creationId xmlns:a16="http://schemas.microsoft.com/office/drawing/2014/main" id="{D2EB24B0-CFEF-4A16-88F1-CA6E927E7E75}"/>
+                </a:ext>
+              </a:extLst>
+            </p:cNvPr>
+            <p:cNvSpPr txBox="1"/>
+            <p:nvPr/>
+          </p:nvSpPr>
+          <p:spPr>
+            <a:xfrm>
+              <a:off x="8373582" y="3198167"/>
+              <a:ext cx="3352376" cy="461665"/>
+            </a:xfrm>
+            <a:prstGeom prst="rect">
+              <a:avLst/>
+            </a:prstGeom>
+            <a:solidFill>
+              <a:schemeClr val="bg1"/>
+            </a:solidFill>
+            <a:effectLst>
+              <a:outerShdw blurRad="50800" dist="38100" dir="2700000" algn="tl" rotWithShape="0">
+                <a:prstClr val="black">
+                  <a:alpha val="40000"/>
+                </a:prstClr>
+              </a:outerShdw>
+            </a:effectLst>
+          </p:spPr>
+          <p:txBody>
+            <a:bodyPr wrap="square" rtlCol="0">
+              <a:spAutoFit/>
+            </a:bodyPr>
+            <a:lstStyle/>
+            <a:p>
+              <a:r>
+                <a:rPr lang="en-US" sz="1200" dirty="0">
+                  <a:latin typeface="Arvo" panose="02000000000000000000" pitchFamily="2" charset="0"/>
+                </a:rPr>
+                <a:t>Where to send the participant after the study. (e.g. </a:t>
+              </a:r>
+              <a:r>
+                <a:rPr lang="en-US" sz="1200" dirty="0" err="1">
+                  <a:latin typeface="Arvo" panose="02000000000000000000" pitchFamily="2" charset="0"/>
+                </a:rPr>
+                <a:t>daisychain</a:t>
+              </a:r>
+              <a:r>
+                <a:rPr lang="en-US" sz="1200" dirty="0">
+                  <a:latin typeface="Arvo" panose="02000000000000000000" pitchFamily="2" charset="0"/>
+                </a:rPr>
+                <a:t> with Qualtrics)</a:t>
+              </a:r>
+              <a:endParaRPr lang="en-GB" sz="1200" dirty="0">
+                <a:latin typeface="Arvo" panose="02000000000000000000" pitchFamily="2" charset="0"/>
+              </a:endParaRPr>
+            </a:p>
+          </p:txBody>
+        </p:sp>
+        <p:sp>
+          <p:nvSpPr>
+            <p:cNvPr id="63" name="Arrow: Down 62">
+              <a:extLst>
+                <a:ext uri="{FF2B5EF4-FFF2-40B4-BE49-F238E27FC236}">
+                  <a16:creationId xmlns:a16="http://schemas.microsoft.com/office/drawing/2014/main" id="{7E116B91-E7AA-489E-82E1-AF288F11CB94}"/>
+                </a:ext>
+              </a:extLst>
+            </p:cNvPr>
+            <p:cNvSpPr/>
+            <p:nvPr/>
+          </p:nvSpPr>
+          <p:spPr>
+            <a:xfrm rot="7760581">
+              <a:off x="6631513" y="3588718"/>
+              <a:ext cx="311708" cy="865208"/>
+            </a:xfrm>
+            <a:prstGeom prst="downArrow">
+              <a:avLst/>
+            </a:prstGeom>
+            <a:solidFill>
+              <a:srgbClr val="FF0000"/>
+            </a:solidFill>
+            <a:ln>
+              <a:solidFill>
+                <a:srgbClr val="FF0000"/>
+              </a:solidFill>
+            </a:ln>
+          </p:spPr>
+          <p:style>
+            <a:lnRef idx="2">
+              <a:schemeClr val="accent1">
+                <a:shade val="50000"/>
+              </a:schemeClr>
+            </a:lnRef>
+            <a:fillRef idx="1">
+              <a:schemeClr val="accent1"/>
+            </a:fillRef>
+            <a:effectRef idx="0">
+              <a:schemeClr val="accent1"/>
+            </a:effectRef>
+            <a:fontRef idx="minor">
+              <a:schemeClr val="lt1"/>
+            </a:fontRef>
+          </p:style>
+          <p:txBody>
+            <a:bodyPr rtlCol="0" anchor="ctr"/>
+            <a:lstStyle/>
+            <a:p>
+              <a:pPr algn="ctr"/>
+              <a:endParaRPr lang="en-GB"/>
+            </a:p>
+          </p:txBody>
+        </p:sp>
+        <p:sp>
+          <p:nvSpPr>
+            <p:cNvPr id="64" name="Oval 63">
+              <a:extLst>
+                <a:ext uri="{FF2B5EF4-FFF2-40B4-BE49-F238E27FC236}">
+                  <a16:creationId xmlns:a16="http://schemas.microsoft.com/office/drawing/2014/main" id="{16FBAB6B-BF00-4A26-B94B-CB038A34E874}"/>
+                </a:ext>
+              </a:extLst>
+            </p:cNvPr>
+            <p:cNvSpPr/>
+            <p:nvPr/>
+          </p:nvSpPr>
+          <p:spPr>
+            <a:xfrm rot="60630">
+              <a:off x="6881111" y="4094951"/>
+              <a:ext cx="737993" cy="703336"/>
+            </a:xfrm>
+            <a:prstGeom prst="ellipse">
+              <a:avLst/>
+            </a:prstGeom>
+            <a:solidFill>
+              <a:schemeClr val="bg1"/>
+            </a:solidFill>
+            <a:ln w="28575">
+              <a:solidFill>
+                <a:srgbClr val="FF0000"/>
+              </a:solidFill>
+            </a:ln>
+          </p:spPr>
+          <p:style>
+            <a:lnRef idx="2">
+              <a:schemeClr val="accent1">
+                <a:shade val="50000"/>
+              </a:schemeClr>
+            </a:lnRef>
+            <a:fillRef idx="1">
+              <a:schemeClr val="accent1"/>
+            </a:fillRef>
+            <a:effectRef idx="0">
+              <a:schemeClr val="accent1"/>
+            </a:effectRef>
+            <a:fontRef idx="minor">
+              <a:schemeClr val="lt1"/>
+            </a:fontRef>
+          </p:style>
+          <p:txBody>
+            <a:bodyPr rtlCol="0" anchor="ctr"/>
+            <a:lstStyle/>
+            <a:p>
+              <a:pPr algn="ctr"/>
+              <a:endParaRPr lang="en-GB"/>
+            </a:p>
+          </p:txBody>
+        </p:sp>
+        <p:sp>
+          <p:nvSpPr>
+            <p:cNvPr id="65" name="TextBox 64">
+              <a:extLst>
+                <a:ext uri="{FF2B5EF4-FFF2-40B4-BE49-F238E27FC236}">
+                  <a16:creationId xmlns:a16="http://schemas.microsoft.com/office/drawing/2014/main" id="{C33CBC54-4B6B-4557-9B11-0DE2D453DFC5}"/>
+                </a:ext>
+              </a:extLst>
+            </p:cNvPr>
+            <p:cNvSpPr txBox="1"/>
+            <p:nvPr/>
+          </p:nvSpPr>
+          <p:spPr>
+            <a:xfrm rot="60630">
+              <a:off x="7016464" y="4092849"/>
+              <a:ext cx="470000" cy="707886"/>
+            </a:xfrm>
+            <a:prstGeom prst="rect">
+              <a:avLst/>
+            </a:prstGeom>
+            <a:noFill/>
+          </p:spPr>
+          <p:txBody>
+            <a:bodyPr wrap="none" rtlCol="0">
+              <a:spAutoFit/>
+            </a:bodyPr>
+            <a:lstStyle/>
+            <a:p>
+              <a:r>
+                <a:rPr lang="en-US" sz="4000" dirty="0">
+                  <a:latin typeface="Arvo" panose="02000000000000000000" pitchFamily="2" charset="0"/>
+                </a:rPr>
+                <a:t>5</a:t>
+              </a:r>
+              <a:endParaRPr lang="en-GB" sz="4000" dirty="0">
+                <a:latin typeface="Arvo" panose="02000000000000000000" pitchFamily="2" charset="0"/>
+              </a:endParaRPr>
+            </a:p>
+          </p:txBody>
+        </p:sp>
+        <p:sp>
+          <p:nvSpPr>
+            <p:cNvPr id="66" name="TextBox 65">
+              <a:extLst>
+                <a:ext uri="{FF2B5EF4-FFF2-40B4-BE49-F238E27FC236}">
+                  <a16:creationId xmlns:a16="http://schemas.microsoft.com/office/drawing/2014/main" id="{AF0D9116-813D-4BCC-ACF2-427798711C2E}"/>
+                </a:ext>
+              </a:extLst>
+            </p:cNvPr>
+            <p:cNvSpPr txBox="1"/>
+            <p:nvPr/>
+          </p:nvSpPr>
+          <p:spPr>
+            <a:xfrm>
+              <a:off x="7415207" y="4208496"/>
+              <a:ext cx="3352376" cy="461665"/>
+            </a:xfrm>
+            <a:prstGeom prst="rect">
+              <a:avLst/>
+            </a:prstGeom>
+            <a:solidFill>
+              <a:schemeClr val="bg1"/>
+            </a:solidFill>
+            <a:effectLst>
+              <a:outerShdw blurRad="50800" dist="38100" dir="2700000" algn="tl" rotWithShape="0">
+                <a:prstClr val="black">
+                  <a:alpha val="40000"/>
+                </a:prstClr>
+              </a:outerShdw>
+            </a:effectLst>
+          </p:spPr>
+          <p:txBody>
+            <a:bodyPr wrap="square" rtlCol="0">
+              <a:spAutoFit/>
+            </a:bodyPr>
+            <a:lstStyle/>
+            <a:p>
+              <a:r>
+                <a:rPr lang="en-US" sz="1200" dirty="0">
+                  <a:latin typeface="Arvo" panose="02000000000000000000" pitchFamily="2" charset="0"/>
+                </a:rPr>
+                <a:t>Resources needed by the experiment (e.g. image files, csv files).</a:t>
+              </a:r>
+              <a:endParaRPr lang="en-GB" sz="1200" dirty="0">
+                <a:latin typeface="Arvo" panose="02000000000000000000" pitchFamily="2" charset="0"/>
+              </a:endParaRPr>
+            </a:p>
+          </p:txBody>
+        </p:sp>
+      </p:grpSp>
+    </p:spTree>
+    <p:extLst>
+      <p:ext uri="{BB962C8B-B14F-4D97-AF65-F5344CB8AC3E}">
+        <p14:creationId xmlns:p14="http://schemas.microsoft.com/office/powerpoint/2010/main" val="3245792579"/>
+      </p:ext>
+    </p:extLst>
+  </p:cSld>
+  <p:clrMapOvr>
+    <a:masterClrMapping/>
+  </p:clrMapOvr>
+</p:sld>
+</file>
+
 <file path=ppt/theme/theme1.xml><?xml version="1.0" encoding="utf-8"?>
 <a:theme xmlns:a="http://schemas.openxmlformats.org/drawingml/2006/main" name="Office Theme">
   <a:themeElements>

</xml_diff>